<commit_message>
updated Creativity North assets with new resolution, 3840x1200
</commit_message>
<xml_diff>
--- a/powerpoint/creativity_studio/creativity_north.pptx
+++ b/powerpoint/creativity_studio/creativity_north.pptx
@@ -10,14 +10,14 @@
   <p:sldIdLst>
     <p:sldId id="263" r:id="rId2"/>
   </p:sldIdLst>
-  <p:sldSz cx="10698163" cy="3200400"/>
+  <p:sldSz cx="11366500" cy="3548063"/>
   <p:notesSz cx="6858000" cy="9144000"/>
   <p:defaultTextStyle>
     <a:defPPr>
       <a:defRPr lang="en-US"/>
     </a:defPPr>
-    <a:lvl1pPr marL="0" algn="l" defTabSz="443984" rtl="0" eaLnBrk="1" latinLnBrk="0" hangingPunct="1">
-      <a:defRPr sz="1700" kern="1200">
+    <a:lvl1pPr marL="0" algn="l" defTabSz="476439" rtl="0" eaLnBrk="1" latinLnBrk="0" hangingPunct="1">
+      <a:defRPr sz="1824" kern="1200">
         <a:solidFill>
           <a:schemeClr val="tx1"/>
         </a:solidFill>
@@ -26,8 +26,8 @@
         <a:cs typeface="+mn-cs"/>
       </a:defRPr>
     </a:lvl1pPr>
-    <a:lvl2pPr marL="443984" algn="l" defTabSz="443984" rtl="0" eaLnBrk="1" latinLnBrk="0" hangingPunct="1">
-      <a:defRPr sz="1700" kern="1200">
+    <a:lvl2pPr marL="476439" algn="l" defTabSz="476439" rtl="0" eaLnBrk="1" latinLnBrk="0" hangingPunct="1">
+      <a:defRPr sz="1824" kern="1200">
         <a:solidFill>
           <a:schemeClr val="tx1"/>
         </a:solidFill>
@@ -36,8 +36,8 @@
         <a:cs typeface="+mn-cs"/>
       </a:defRPr>
     </a:lvl2pPr>
-    <a:lvl3pPr marL="887969" algn="l" defTabSz="443984" rtl="0" eaLnBrk="1" latinLnBrk="0" hangingPunct="1">
-      <a:defRPr sz="1700" kern="1200">
+    <a:lvl3pPr marL="952880" algn="l" defTabSz="476439" rtl="0" eaLnBrk="1" latinLnBrk="0" hangingPunct="1">
+      <a:defRPr sz="1824" kern="1200">
         <a:solidFill>
           <a:schemeClr val="tx1"/>
         </a:solidFill>
@@ -46,8 +46,8 @@
         <a:cs typeface="+mn-cs"/>
       </a:defRPr>
     </a:lvl3pPr>
-    <a:lvl4pPr marL="1331954" algn="l" defTabSz="443984" rtl="0" eaLnBrk="1" latinLnBrk="0" hangingPunct="1">
-      <a:defRPr sz="1700" kern="1200">
+    <a:lvl4pPr marL="1429320" algn="l" defTabSz="476439" rtl="0" eaLnBrk="1" latinLnBrk="0" hangingPunct="1">
+      <a:defRPr sz="1824" kern="1200">
         <a:solidFill>
           <a:schemeClr val="tx1"/>
         </a:solidFill>
@@ -56,8 +56,8 @@
         <a:cs typeface="+mn-cs"/>
       </a:defRPr>
     </a:lvl4pPr>
-    <a:lvl5pPr marL="1775938" algn="l" defTabSz="443984" rtl="0" eaLnBrk="1" latinLnBrk="0" hangingPunct="1">
-      <a:defRPr sz="1700" kern="1200">
+    <a:lvl5pPr marL="1905759" algn="l" defTabSz="476439" rtl="0" eaLnBrk="1" latinLnBrk="0" hangingPunct="1">
+      <a:defRPr sz="1824" kern="1200">
         <a:solidFill>
           <a:schemeClr val="tx1"/>
         </a:solidFill>
@@ -66,8 +66,8 @@
         <a:cs typeface="+mn-cs"/>
       </a:defRPr>
     </a:lvl5pPr>
-    <a:lvl6pPr marL="2219922" algn="l" defTabSz="443984" rtl="0" eaLnBrk="1" latinLnBrk="0" hangingPunct="1">
-      <a:defRPr sz="1700" kern="1200">
+    <a:lvl6pPr marL="2382198" algn="l" defTabSz="476439" rtl="0" eaLnBrk="1" latinLnBrk="0" hangingPunct="1">
+      <a:defRPr sz="1824" kern="1200">
         <a:solidFill>
           <a:schemeClr val="tx1"/>
         </a:solidFill>
@@ -76,8 +76,8 @@
         <a:cs typeface="+mn-cs"/>
       </a:defRPr>
     </a:lvl6pPr>
-    <a:lvl7pPr marL="2663907" algn="l" defTabSz="443984" rtl="0" eaLnBrk="1" latinLnBrk="0" hangingPunct="1">
-      <a:defRPr sz="1700" kern="1200">
+    <a:lvl7pPr marL="2858639" algn="l" defTabSz="476439" rtl="0" eaLnBrk="1" latinLnBrk="0" hangingPunct="1">
+      <a:defRPr sz="1824" kern="1200">
         <a:solidFill>
           <a:schemeClr val="tx1"/>
         </a:solidFill>
@@ -86,8 +86,8 @@
         <a:cs typeface="+mn-cs"/>
       </a:defRPr>
     </a:lvl7pPr>
-    <a:lvl8pPr marL="3107891" algn="l" defTabSz="443984" rtl="0" eaLnBrk="1" latinLnBrk="0" hangingPunct="1">
-      <a:defRPr sz="1700" kern="1200">
+    <a:lvl8pPr marL="3335078" algn="l" defTabSz="476439" rtl="0" eaLnBrk="1" latinLnBrk="0" hangingPunct="1">
+      <a:defRPr sz="1824" kern="1200">
         <a:solidFill>
           <a:schemeClr val="tx1"/>
         </a:solidFill>
@@ -96,8 +96,8 @@
         <a:cs typeface="+mn-cs"/>
       </a:defRPr>
     </a:lvl8pPr>
-    <a:lvl9pPr marL="3551875" algn="l" defTabSz="443984" rtl="0" eaLnBrk="1" latinLnBrk="0" hangingPunct="1">
-      <a:defRPr sz="1700" kern="1200">
+    <a:lvl9pPr marL="3811517" algn="l" defTabSz="476439" rtl="0" eaLnBrk="1" latinLnBrk="0" hangingPunct="1">
+      <a:defRPr sz="1824" kern="1200">
         <a:solidFill>
           <a:schemeClr val="tx1"/>
         </a:solidFill>
@@ -109,13 +109,23 @@
   </p:defaultTextStyle>
   <p:extLst>
     <p:ext uri="{EFAFB233-063F-42B5-8137-9DF3F51BA10A}">
-      <p15:sldGuideLst xmlns:p15="http://schemas.microsoft.com/office/powerpoint/2012/main" xmlns="">
-        <p15:guide id="1" orient="horz" pos="1037" userDrawn="1">
+      <p15:sldGuideLst xmlns:p15="http://schemas.microsoft.com/office/powerpoint/2012/main">
+        <p15:guide id="1" orient="horz" pos="1150" userDrawn="1">
           <p15:clr>
             <a:srgbClr val="A4A3A4"/>
           </p15:clr>
         </p15:guide>
-        <p15:guide id="2" pos="3629" userDrawn="1">
+        <p15:guide id="2" pos="3856" userDrawn="1">
+          <p15:clr>
+            <a:srgbClr val="A4A3A4"/>
+          </p15:clr>
+        </p15:guide>
+        <p15:guide id="3" orient="horz" pos="1118" userDrawn="1">
+          <p15:clr>
+            <a:srgbClr val="A4A3A4"/>
+          </p15:clr>
+        </p15:guide>
+        <p15:guide id="4" pos="3581" userDrawn="1">
           <p15:clr>
             <a:srgbClr val="A4A3A4"/>
           </p15:clr>
@@ -208,7 +218,7 @@
           <a:p>
             <a:fld id="{A8DD1C4E-17A0-2A4C-99D2-FAFEE8607A3F}" type="datetimeFigureOut">
               <a:rPr lang="en-US" smtClean="0"/>
-              <a:t>8/7/15</a:t>
+              <a:t>8/5/19</a:t>
             </a:fld>
             <a:endParaRPr lang="en-US"/>
           </a:p>
@@ -226,8 +236,8 @@
         </p:nvSpPr>
         <p:spPr>
           <a:xfrm>
-            <a:off x="-2301875" y="685800"/>
-            <a:ext cx="11461750" cy="3429000"/>
+            <a:off x="-2063750" y="685800"/>
+            <a:ext cx="10985500" cy="3429000"/>
           </a:xfrm>
           <a:prstGeom prst="rect">
             <a:avLst/>
@@ -272,38 +282,37 @@
           <a:p>
             <a:pPr lvl="0"/>
             <a:r>
-              <a:rPr lang="en-US" smtClean="0"/>
+              <a:rPr lang="en-US"/>
               <a:t>Click to edit Master text styles</a:t>
             </a:r>
           </a:p>
           <a:p>
             <a:pPr lvl="1"/>
             <a:r>
-              <a:rPr lang="en-US" smtClean="0"/>
+              <a:rPr lang="en-US"/>
               <a:t>Second level</a:t>
             </a:r>
           </a:p>
           <a:p>
             <a:pPr lvl="2"/>
             <a:r>
-              <a:rPr lang="en-US" smtClean="0"/>
+              <a:rPr lang="en-US"/>
               <a:t>Third level</a:t>
             </a:r>
           </a:p>
           <a:p>
             <a:pPr lvl="3"/>
             <a:r>
-              <a:rPr lang="en-US" smtClean="0"/>
+              <a:rPr lang="en-US"/>
               <a:t>Fourth level</a:t>
             </a:r>
           </a:p>
           <a:p>
             <a:pPr lvl="4"/>
             <a:r>
-              <a:rPr lang="en-US" smtClean="0"/>
+              <a:rPr lang="en-US"/>
               <a:t>Fifth level</a:t>
             </a:r>
-            <a:endParaRPr lang="en-US"/>
           </a:p>
         </p:txBody>
       </p:sp>
@@ -382,8 +391,8 @@
   </p:cSld>
   <p:clrMap bg1="lt1" tx1="dk1" bg2="lt2" tx2="dk2" accent1="accent1" accent2="accent2" accent3="accent3" accent4="accent4" accent5="accent5" accent6="accent6" hlink="hlink" folHlink="folHlink"/>
   <p:notesStyle>
-    <a:lvl1pPr marL="0" algn="l" defTabSz="443984" rtl="0" eaLnBrk="1" latinLnBrk="0" hangingPunct="1">
-      <a:defRPr sz="1200" kern="1200">
+    <a:lvl1pPr marL="0" algn="l" defTabSz="476439" rtl="0" eaLnBrk="1" latinLnBrk="0" hangingPunct="1">
+      <a:defRPr sz="1288" kern="1200">
         <a:solidFill>
           <a:schemeClr val="tx1"/>
         </a:solidFill>
@@ -392,8 +401,8 @@
         <a:cs typeface="+mn-cs"/>
       </a:defRPr>
     </a:lvl1pPr>
-    <a:lvl2pPr marL="443984" algn="l" defTabSz="443984" rtl="0" eaLnBrk="1" latinLnBrk="0" hangingPunct="1">
-      <a:defRPr sz="1200" kern="1200">
+    <a:lvl2pPr marL="476439" algn="l" defTabSz="476439" rtl="0" eaLnBrk="1" latinLnBrk="0" hangingPunct="1">
+      <a:defRPr sz="1288" kern="1200">
         <a:solidFill>
           <a:schemeClr val="tx1"/>
         </a:solidFill>
@@ -402,8 +411,8 @@
         <a:cs typeface="+mn-cs"/>
       </a:defRPr>
     </a:lvl2pPr>
-    <a:lvl3pPr marL="887969" algn="l" defTabSz="443984" rtl="0" eaLnBrk="1" latinLnBrk="0" hangingPunct="1">
-      <a:defRPr sz="1200" kern="1200">
+    <a:lvl3pPr marL="952880" algn="l" defTabSz="476439" rtl="0" eaLnBrk="1" latinLnBrk="0" hangingPunct="1">
+      <a:defRPr sz="1288" kern="1200">
         <a:solidFill>
           <a:schemeClr val="tx1"/>
         </a:solidFill>
@@ -412,8 +421,8 @@
         <a:cs typeface="+mn-cs"/>
       </a:defRPr>
     </a:lvl3pPr>
-    <a:lvl4pPr marL="1331954" algn="l" defTabSz="443984" rtl="0" eaLnBrk="1" latinLnBrk="0" hangingPunct="1">
-      <a:defRPr sz="1200" kern="1200">
+    <a:lvl4pPr marL="1429320" algn="l" defTabSz="476439" rtl="0" eaLnBrk="1" latinLnBrk="0" hangingPunct="1">
+      <a:defRPr sz="1288" kern="1200">
         <a:solidFill>
           <a:schemeClr val="tx1"/>
         </a:solidFill>
@@ -422,8 +431,8 @@
         <a:cs typeface="+mn-cs"/>
       </a:defRPr>
     </a:lvl4pPr>
-    <a:lvl5pPr marL="1775938" algn="l" defTabSz="443984" rtl="0" eaLnBrk="1" latinLnBrk="0" hangingPunct="1">
-      <a:defRPr sz="1200" kern="1200">
+    <a:lvl5pPr marL="1905759" algn="l" defTabSz="476439" rtl="0" eaLnBrk="1" latinLnBrk="0" hangingPunct="1">
+      <a:defRPr sz="1288" kern="1200">
         <a:solidFill>
           <a:schemeClr val="tx1"/>
         </a:solidFill>
@@ -432,8 +441,8 @@
         <a:cs typeface="+mn-cs"/>
       </a:defRPr>
     </a:lvl5pPr>
-    <a:lvl6pPr marL="2219922" algn="l" defTabSz="443984" rtl="0" eaLnBrk="1" latinLnBrk="0" hangingPunct="1">
-      <a:defRPr sz="1200" kern="1200">
+    <a:lvl6pPr marL="2382198" algn="l" defTabSz="476439" rtl="0" eaLnBrk="1" latinLnBrk="0" hangingPunct="1">
+      <a:defRPr sz="1288" kern="1200">
         <a:solidFill>
           <a:schemeClr val="tx1"/>
         </a:solidFill>
@@ -442,8 +451,8 @@
         <a:cs typeface="+mn-cs"/>
       </a:defRPr>
     </a:lvl6pPr>
-    <a:lvl7pPr marL="2663907" algn="l" defTabSz="443984" rtl="0" eaLnBrk="1" latinLnBrk="0" hangingPunct="1">
-      <a:defRPr sz="1200" kern="1200">
+    <a:lvl7pPr marL="2858639" algn="l" defTabSz="476439" rtl="0" eaLnBrk="1" latinLnBrk="0" hangingPunct="1">
+      <a:defRPr sz="1288" kern="1200">
         <a:solidFill>
           <a:schemeClr val="tx1"/>
         </a:solidFill>
@@ -452,8 +461,8 @@
         <a:cs typeface="+mn-cs"/>
       </a:defRPr>
     </a:lvl7pPr>
-    <a:lvl8pPr marL="3107891" algn="l" defTabSz="443984" rtl="0" eaLnBrk="1" latinLnBrk="0" hangingPunct="1">
-      <a:defRPr sz="1200" kern="1200">
+    <a:lvl8pPr marL="3335078" algn="l" defTabSz="476439" rtl="0" eaLnBrk="1" latinLnBrk="0" hangingPunct="1">
+      <a:defRPr sz="1288" kern="1200">
         <a:solidFill>
           <a:schemeClr val="tx1"/>
         </a:solidFill>
@@ -462,8 +471,8 @@
         <a:cs typeface="+mn-cs"/>
       </a:defRPr>
     </a:lvl8pPr>
-    <a:lvl9pPr marL="3551875" algn="l" defTabSz="443984" rtl="0" eaLnBrk="1" latinLnBrk="0" hangingPunct="1">
-      <a:defRPr sz="1200" kern="1200">
+    <a:lvl9pPr marL="3811517" algn="l" defTabSz="476439" rtl="0" eaLnBrk="1" latinLnBrk="0" hangingPunct="1">
+      <a:defRPr sz="1288" kern="1200">
         <a:solidFill>
           <a:schemeClr val="tx1"/>
         </a:solidFill>
@@ -474,6 +483,106 @@
     </a:lvl9pPr>
   </p:notesStyle>
 </p:notesMaster>
+</file>
+
+<file path=ppt/notesSlides/notesSlide1.xml><?xml version="1.0" encoding="utf-8"?>
+<p:notes xmlns:a="http://schemas.openxmlformats.org/drawingml/2006/main" xmlns:r="http://schemas.openxmlformats.org/officeDocument/2006/relationships" xmlns:p="http://schemas.openxmlformats.org/presentationml/2006/main">
+  <p:cSld>
+    <p:spTree>
+      <p:nvGrpSpPr>
+        <p:cNvPr id="1" name=""/>
+        <p:cNvGrpSpPr/>
+        <p:nvPr/>
+      </p:nvGrpSpPr>
+      <p:grpSpPr>
+        <a:xfrm>
+          <a:off x="0" y="0"/>
+          <a:ext cx="0" cy="0"/>
+          <a:chOff x="0" y="0"/>
+          <a:chExt cx="0" cy="0"/>
+        </a:xfrm>
+      </p:grpSpPr>
+      <p:sp>
+        <p:nvSpPr>
+          <p:cNvPr id="2" name="Slide Image Placeholder 1"/>
+          <p:cNvSpPr>
+            <a:spLocks noGrp="1" noRot="1" noChangeAspect="1"/>
+          </p:cNvSpPr>
+          <p:nvPr>
+            <p:ph type="sldImg"/>
+          </p:nvPr>
+        </p:nvSpPr>
+        <p:spPr/>
+      </p:sp>
+      <p:sp>
+        <p:nvSpPr>
+          <p:cNvPr id="3" name="Notes Placeholder 2"/>
+          <p:cNvSpPr>
+            <a:spLocks noGrp="1"/>
+          </p:cNvSpPr>
+          <p:nvPr>
+            <p:ph type="body" idx="1"/>
+          </p:nvPr>
+        </p:nvSpPr>
+        <p:spPr/>
+        <p:txBody>
+          <a:bodyPr/>
+          <a:lstStyle/>
+          <a:p>
+            <a:r>
+              <a:rPr lang="en-US" dirty="0"/>
+              <a:t>The resolution of the </a:t>
+            </a:r>
+            <a:r>
+              <a:rPr lang="en-US"/>
+              <a:t>North Wall: 3840px </a:t>
+            </a:r>
+            <a:r>
+              <a:rPr lang="en-US" dirty="0"/>
+              <a:t>width, </a:t>
+            </a:r>
+            <a:r>
+              <a:rPr lang="en-US"/>
+              <a:t>1200px height</a:t>
+            </a:r>
+            <a:endParaRPr lang="en-US" dirty="0"/>
+          </a:p>
+        </p:txBody>
+      </p:sp>
+      <p:sp>
+        <p:nvSpPr>
+          <p:cNvPr id="4" name="Slide Number Placeholder 3"/>
+          <p:cNvSpPr>
+            <a:spLocks noGrp="1"/>
+          </p:cNvSpPr>
+          <p:nvPr>
+            <p:ph type="sldNum" sz="quarter" idx="5"/>
+          </p:nvPr>
+        </p:nvSpPr>
+        <p:spPr/>
+        <p:txBody>
+          <a:bodyPr/>
+          <a:lstStyle/>
+          <a:p>
+            <a:fld id="{EB827439-679E-B344-9926-3FBB09B74F5B}" type="slidenum">
+              <a:rPr lang="en-US" smtClean="0"/>
+              <a:t>1</a:t>
+            </a:fld>
+            <a:endParaRPr lang="en-US"/>
+          </a:p>
+        </p:txBody>
+      </p:sp>
+    </p:spTree>
+    <p:extLst>
+      <p:ext uri="{BB962C8B-B14F-4D97-AF65-F5344CB8AC3E}">
+        <p14:creationId xmlns:p14="http://schemas.microsoft.com/office/powerpoint/2010/main" val="124106317"/>
+      </p:ext>
+    </p:extLst>
+  </p:cSld>
+  <p:clrMapOvr>
+    <a:masterClrMapping/>
+  </p:clrMapOvr>
+</p:notes>
 </file>
 
 <file path=ppt/slideLayouts/slideLayout1.xml><?xml version="1.0" encoding="utf-8"?>
@@ -505,8 +614,8 @@
         </p:nvSpPr>
         <p:spPr>
           <a:xfrm>
-            <a:off x="802362" y="994199"/>
-            <a:ext cx="9093440" cy="686012"/>
+            <a:off x="852487" y="1102200"/>
+            <a:ext cx="9661527" cy="760534"/>
           </a:xfrm>
         </p:spPr>
         <p:txBody>
@@ -514,10 +623,9 @@
           <a:lstStyle/>
           <a:p>
             <a:r>
-              <a:rPr lang="en-US" smtClean="0"/>
+              <a:rPr lang="en-US"/>
               <a:t>Click to edit Master title style</a:t>
             </a:r>
-            <a:endParaRPr lang="en-US"/>
           </a:p>
         </p:txBody>
       </p:sp>
@@ -533,8 +641,8 @@
         </p:nvSpPr>
         <p:spPr>
           <a:xfrm>
-            <a:off x="1604725" y="1813560"/>
-            <a:ext cx="7488714" cy="817880"/>
+            <a:off x="1704976" y="2010569"/>
+            <a:ext cx="7956550" cy="906727"/>
           </a:xfrm>
         </p:spPr>
         <p:txBody>
@@ -550,7 +658,7 @@
                 </a:solidFill>
               </a:defRPr>
             </a:lvl1pPr>
-            <a:lvl2pPr marL="445404" indent="0" algn="ctr">
+            <a:lvl2pPr marL="473242" indent="0" algn="ctr">
               <a:buNone/>
               <a:defRPr>
                 <a:solidFill>
@@ -560,7 +668,7 @@
                 </a:solidFill>
               </a:defRPr>
             </a:lvl2pPr>
-            <a:lvl3pPr marL="890808" indent="0" algn="ctr">
+            <a:lvl3pPr marL="946484" indent="0" algn="ctr">
               <a:buNone/>
               <a:defRPr>
                 <a:solidFill>
@@ -570,7 +678,7 @@
                 </a:solidFill>
               </a:defRPr>
             </a:lvl3pPr>
-            <a:lvl4pPr marL="1336213" indent="0" algn="ctr">
+            <a:lvl4pPr marL="1419726" indent="0" algn="ctr">
               <a:buNone/>
               <a:defRPr>
                 <a:solidFill>
@@ -580,7 +688,7 @@
                 </a:solidFill>
               </a:defRPr>
             </a:lvl4pPr>
-            <a:lvl5pPr marL="1781617" indent="0" algn="ctr">
+            <a:lvl5pPr marL="1892968" indent="0" algn="ctr">
               <a:buNone/>
               <a:defRPr>
                 <a:solidFill>
@@ -590,7 +698,7 @@
                 </a:solidFill>
               </a:defRPr>
             </a:lvl5pPr>
-            <a:lvl6pPr marL="2227021" indent="0" algn="ctr">
+            <a:lvl6pPr marL="2366210" indent="0" algn="ctr">
               <a:buNone/>
               <a:defRPr>
                 <a:solidFill>
@@ -600,7 +708,7 @@
                 </a:solidFill>
               </a:defRPr>
             </a:lvl6pPr>
-            <a:lvl7pPr marL="2672425" indent="0" algn="ctr">
+            <a:lvl7pPr marL="2839452" indent="0" algn="ctr">
               <a:buNone/>
               <a:defRPr>
                 <a:solidFill>
@@ -610,7 +718,7 @@
                 </a:solidFill>
               </a:defRPr>
             </a:lvl7pPr>
-            <a:lvl8pPr marL="3117830" indent="0" algn="ctr">
+            <a:lvl8pPr marL="3312694" indent="0" algn="ctr">
               <a:buNone/>
               <a:defRPr>
                 <a:solidFill>
@@ -620,7 +728,7 @@
                 </a:solidFill>
               </a:defRPr>
             </a:lvl8pPr>
-            <a:lvl9pPr marL="3563234" indent="0" algn="ctr">
+            <a:lvl9pPr marL="3785936" indent="0" algn="ctr">
               <a:buNone/>
               <a:defRPr>
                 <a:solidFill>
@@ -633,10 +741,9 @@
           </a:lstStyle>
           <a:p>
             <a:r>
-              <a:rPr lang="en-US" smtClean="0"/>
+              <a:rPr lang="en-US"/>
               <a:t>Click to edit Master subtitle style</a:t>
             </a:r>
-            <a:endParaRPr lang="en-US"/>
           </a:p>
         </p:txBody>
       </p:sp>
@@ -657,7 +764,7 @@
           <a:p>
             <a:fld id="{5E1DB631-D0B3-B145-A691-00AE099C1923}" type="datetimeFigureOut">
               <a:rPr lang="en-US" smtClean="0"/>
-              <a:t>8/7/15</a:t>
+              <a:t>8/5/19</a:t>
             </a:fld>
             <a:endParaRPr lang="en-US"/>
           </a:p>
@@ -758,10 +865,9 @@
           <a:lstStyle/>
           <a:p>
             <a:r>
-              <a:rPr lang="en-US" smtClean="0"/>
+              <a:rPr lang="en-US"/>
               <a:t>Click to edit Master title style</a:t>
             </a:r>
-            <a:endParaRPr lang="en-US"/>
           </a:p>
         </p:txBody>
       </p:sp>
@@ -782,38 +888,37 @@
           <a:p>
             <a:pPr lvl="0"/>
             <a:r>
-              <a:rPr lang="en-US" smtClean="0"/>
+              <a:rPr lang="en-US"/>
               <a:t>Click to edit Master text styles</a:t>
             </a:r>
           </a:p>
           <a:p>
             <a:pPr lvl="1"/>
             <a:r>
-              <a:rPr lang="en-US" smtClean="0"/>
+              <a:rPr lang="en-US"/>
               <a:t>Second level</a:t>
             </a:r>
           </a:p>
           <a:p>
             <a:pPr lvl="2"/>
             <a:r>
-              <a:rPr lang="en-US" smtClean="0"/>
+              <a:rPr lang="en-US"/>
               <a:t>Third level</a:t>
             </a:r>
           </a:p>
           <a:p>
             <a:pPr lvl="3"/>
             <a:r>
-              <a:rPr lang="en-US" smtClean="0"/>
+              <a:rPr lang="en-US"/>
               <a:t>Fourth level</a:t>
             </a:r>
           </a:p>
           <a:p>
             <a:pPr lvl="4"/>
             <a:r>
-              <a:rPr lang="en-US" smtClean="0"/>
+              <a:rPr lang="en-US"/>
               <a:t>Fifth level</a:t>
             </a:r>
-            <a:endParaRPr lang="en-US"/>
           </a:p>
         </p:txBody>
       </p:sp>
@@ -834,7 +939,7 @@
           <a:p>
             <a:fld id="{5E1DB631-D0B3-B145-A691-00AE099C1923}" type="datetimeFigureOut">
               <a:rPr lang="en-US" smtClean="0"/>
-              <a:t>8/7/15</a:t>
+              <a:t>8/5/19</a:t>
             </a:fld>
             <a:endParaRPr lang="en-US"/>
           </a:p>
@@ -924,8 +1029,8 @@
         </p:nvSpPr>
         <p:spPr>
           <a:xfrm>
-            <a:off x="7756169" y="128165"/>
-            <a:ext cx="2407087" cy="2730712"/>
+            <a:off x="8240714" y="142088"/>
+            <a:ext cx="2557463" cy="3027352"/>
           </a:xfrm>
         </p:spPr>
         <p:txBody>
@@ -933,10 +1038,9 @@
           <a:lstStyle/>
           <a:p>
             <a:r>
-              <a:rPr lang="en-US" smtClean="0"/>
+              <a:rPr lang="en-US"/>
               <a:t>Click to edit Master title style</a:t>
             </a:r>
-            <a:endParaRPr lang="en-US"/>
           </a:p>
         </p:txBody>
       </p:sp>
@@ -952,8 +1056,8 @@
         </p:nvSpPr>
         <p:spPr>
           <a:xfrm>
-            <a:off x="534908" y="128165"/>
-            <a:ext cx="7042957" cy="2730712"/>
+            <a:off x="568325" y="142088"/>
+            <a:ext cx="7482946" cy="3027352"/>
           </a:xfrm>
         </p:spPr>
         <p:txBody>
@@ -962,38 +1066,37 @@
           <a:p>
             <a:pPr lvl="0"/>
             <a:r>
-              <a:rPr lang="en-US" smtClean="0"/>
+              <a:rPr lang="en-US"/>
               <a:t>Click to edit Master text styles</a:t>
             </a:r>
           </a:p>
           <a:p>
             <a:pPr lvl="1"/>
             <a:r>
-              <a:rPr lang="en-US" smtClean="0"/>
+              <a:rPr lang="en-US"/>
               <a:t>Second level</a:t>
             </a:r>
           </a:p>
           <a:p>
             <a:pPr lvl="2"/>
             <a:r>
-              <a:rPr lang="en-US" smtClean="0"/>
+              <a:rPr lang="en-US"/>
               <a:t>Third level</a:t>
             </a:r>
           </a:p>
           <a:p>
             <a:pPr lvl="3"/>
             <a:r>
-              <a:rPr lang="en-US" smtClean="0"/>
+              <a:rPr lang="en-US"/>
               <a:t>Fourth level</a:t>
             </a:r>
           </a:p>
           <a:p>
             <a:pPr lvl="4"/>
             <a:r>
-              <a:rPr lang="en-US" smtClean="0"/>
+              <a:rPr lang="en-US"/>
               <a:t>Fifth level</a:t>
             </a:r>
-            <a:endParaRPr lang="en-US"/>
           </a:p>
         </p:txBody>
       </p:sp>
@@ -1014,7 +1117,7 @@
           <a:p>
             <a:fld id="{5E1DB631-D0B3-B145-A691-00AE099C1923}" type="datetimeFigureOut">
               <a:rPr lang="en-US" smtClean="0"/>
-              <a:t>8/7/15</a:t>
+              <a:t>8/5/19</a:t>
             </a:fld>
             <a:endParaRPr lang="en-US"/>
           </a:p>
@@ -1108,10 +1211,9 @@
           <a:lstStyle/>
           <a:p>
             <a:r>
-              <a:rPr lang="en-US" smtClean="0"/>
+              <a:rPr lang="en-US"/>
               <a:t>Click to edit Master title style</a:t>
             </a:r>
-            <a:endParaRPr lang="en-US"/>
           </a:p>
         </p:txBody>
       </p:sp>
@@ -1132,38 +1234,37 @@
           <a:p>
             <a:pPr lvl="0"/>
             <a:r>
-              <a:rPr lang="en-US" smtClean="0"/>
+              <a:rPr lang="en-US"/>
               <a:t>Click to edit Master text styles</a:t>
             </a:r>
           </a:p>
           <a:p>
             <a:pPr lvl="1"/>
             <a:r>
-              <a:rPr lang="en-US" smtClean="0"/>
+              <a:rPr lang="en-US"/>
               <a:t>Second level</a:t>
             </a:r>
           </a:p>
           <a:p>
             <a:pPr lvl="2"/>
             <a:r>
-              <a:rPr lang="en-US" smtClean="0"/>
+              <a:rPr lang="en-US"/>
               <a:t>Third level</a:t>
             </a:r>
           </a:p>
           <a:p>
             <a:pPr lvl="3"/>
             <a:r>
-              <a:rPr lang="en-US" smtClean="0"/>
+              <a:rPr lang="en-US"/>
               <a:t>Fourth level</a:t>
             </a:r>
           </a:p>
           <a:p>
             <a:pPr lvl="4"/>
             <a:r>
-              <a:rPr lang="en-US" smtClean="0"/>
+              <a:rPr lang="en-US"/>
               <a:t>Fifth level</a:t>
             </a:r>
-            <a:endParaRPr lang="en-US"/>
           </a:p>
         </p:txBody>
       </p:sp>
@@ -1184,7 +1285,7 @@
           <a:p>
             <a:fld id="{5E1DB631-D0B3-B145-A691-00AE099C1923}" type="datetimeFigureOut">
               <a:rPr lang="en-US" smtClean="0"/>
-              <a:t>8/7/15</a:t>
+              <a:t>8/5/19</a:t>
             </a:fld>
             <a:endParaRPr lang="en-US"/>
           </a:p>
@@ -1274,23 +1375,22 @@
         </p:nvSpPr>
         <p:spPr>
           <a:xfrm>
-            <a:off x="845082" y="2056553"/>
-            <a:ext cx="9093440" cy="635635"/>
+            <a:off x="897876" y="2279959"/>
+            <a:ext cx="9661527" cy="704685"/>
           </a:xfrm>
         </p:spPr>
         <p:txBody>
           <a:bodyPr anchor="t"/>
           <a:lstStyle>
             <a:lvl1pPr algn="l">
-              <a:defRPr sz="3900" b="1" cap="all"/>
+              <a:defRPr sz="4144" b="1" cap="all"/>
             </a:lvl1pPr>
           </a:lstStyle>
           <a:p>
             <a:r>
-              <a:rPr lang="en-US" smtClean="0"/>
+              <a:rPr lang="en-US"/>
               <a:t>Click to edit Master title style</a:t>
             </a:r>
-            <a:endParaRPr lang="en-US"/>
           </a:p>
         </p:txBody>
       </p:sp>
@@ -1306,8 +1406,8 @@
         </p:nvSpPr>
         <p:spPr>
           <a:xfrm>
-            <a:off x="845082" y="1356468"/>
-            <a:ext cx="9093440" cy="700088"/>
+            <a:off x="897876" y="1503823"/>
+            <a:ext cx="9661527" cy="776139"/>
           </a:xfrm>
         </p:spPr>
         <p:txBody>
@@ -1315,7 +1415,7 @@
           <a:lstStyle>
             <a:lvl1pPr marL="0" indent="0">
               <a:buNone/>
-              <a:defRPr sz="1900">
+              <a:defRPr sz="2019">
                 <a:solidFill>
                   <a:schemeClr val="tx1">
                     <a:tint val="75000"/>
@@ -1323,9 +1423,9 @@
                 </a:solidFill>
               </a:defRPr>
             </a:lvl1pPr>
-            <a:lvl2pPr marL="445404" indent="0">
-              <a:buNone/>
-              <a:defRPr sz="1800">
+            <a:lvl2pPr marL="473242" indent="0">
+              <a:buNone/>
+              <a:defRPr sz="1913">
                 <a:solidFill>
                   <a:schemeClr val="tx1">
                     <a:tint val="75000"/>
@@ -1333,9 +1433,9 @@
                 </a:solidFill>
               </a:defRPr>
             </a:lvl2pPr>
-            <a:lvl3pPr marL="890808" indent="0">
-              <a:buNone/>
-              <a:defRPr sz="1600">
+            <a:lvl3pPr marL="946484" indent="0">
+              <a:buNone/>
+              <a:defRPr sz="1700">
                 <a:solidFill>
                   <a:schemeClr val="tx1">
                     <a:tint val="75000"/>
@@ -1343,9 +1443,9 @@
                 </a:solidFill>
               </a:defRPr>
             </a:lvl3pPr>
-            <a:lvl4pPr marL="1336213" indent="0">
-              <a:buNone/>
-              <a:defRPr sz="1400">
+            <a:lvl4pPr marL="1419726" indent="0">
+              <a:buNone/>
+              <a:defRPr sz="1488">
                 <a:solidFill>
                   <a:schemeClr val="tx1">
                     <a:tint val="75000"/>
@@ -1353,9 +1453,9 @@
                 </a:solidFill>
               </a:defRPr>
             </a:lvl4pPr>
-            <a:lvl5pPr marL="1781617" indent="0">
-              <a:buNone/>
-              <a:defRPr sz="1400">
+            <a:lvl5pPr marL="1892968" indent="0">
+              <a:buNone/>
+              <a:defRPr sz="1488">
                 <a:solidFill>
                   <a:schemeClr val="tx1">
                     <a:tint val="75000"/>
@@ -1363,9 +1463,9 @@
                 </a:solidFill>
               </a:defRPr>
             </a:lvl5pPr>
-            <a:lvl6pPr marL="2227021" indent="0">
-              <a:buNone/>
-              <a:defRPr sz="1400">
+            <a:lvl6pPr marL="2366210" indent="0">
+              <a:buNone/>
+              <a:defRPr sz="1488">
                 <a:solidFill>
                   <a:schemeClr val="tx1">
                     <a:tint val="75000"/>
@@ -1373,9 +1473,9 @@
                 </a:solidFill>
               </a:defRPr>
             </a:lvl6pPr>
-            <a:lvl7pPr marL="2672425" indent="0">
-              <a:buNone/>
-              <a:defRPr sz="1400">
+            <a:lvl7pPr marL="2839452" indent="0">
+              <a:buNone/>
+              <a:defRPr sz="1488">
                 <a:solidFill>
                   <a:schemeClr val="tx1">
                     <a:tint val="75000"/>
@@ -1383,9 +1483,9 @@
                 </a:solidFill>
               </a:defRPr>
             </a:lvl7pPr>
-            <a:lvl8pPr marL="3117830" indent="0">
-              <a:buNone/>
-              <a:defRPr sz="1400">
+            <a:lvl8pPr marL="3312694" indent="0">
+              <a:buNone/>
+              <a:defRPr sz="1488">
                 <a:solidFill>
                   <a:schemeClr val="tx1">
                     <a:tint val="75000"/>
@@ -1393,9 +1493,9 @@
                 </a:solidFill>
               </a:defRPr>
             </a:lvl8pPr>
-            <a:lvl9pPr marL="3563234" indent="0">
-              <a:buNone/>
-              <a:defRPr sz="1400">
+            <a:lvl9pPr marL="3785936" indent="0">
+              <a:buNone/>
+              <a:defRPr sz="1488">
                 <a:solidFill>
                   <a:schemeClr val="tx1">
                     <a:tint val="75000"/>
@@ -1407,7 +1507,7 @@
           <a:p>
             <a:pPr lvl="0"/>
             <a:r>
-              <a:rPr lang="en-US" smtClean="0"/>
+              <a:rPr lang="en-US"/>
               <a:t>Click to edit Master text styles</a:t>
             </a:r>
           </a:p>
@@ -1430,7 +1530,7 @@
           <a:p>
             <a:fld id="{5E1DB631-D0B3-B145-A691-00AE099C1923}" type="datetimeFigureOut">
               <a:rPr lang="en-US" smtClean="0"/>
-              <a:t>8/7/15</a:t>
+              <a:t>8/5/19</a:t>
             </a:fld>
             <a:endParaRPr lang="en-US"/>
           </a:p>
@@ -1524,10 +1624,9 @@
           <a:lstStyle/>
           <a:p>
             <a:r>
-              <a:rPr lang="en-US" smtClean="0"/>
+              <a:rPr lang="en-US"/>
               <a:t>Click to edit Master title style</a:t>
             </a:r>
-            <a:endParaRPr lang="en-US"/>
           </a:p>
         </p:txBody>
       </p:sp>
@@ -1543,76 +1642,75 @@
         </p:nvSpPr>
         <p:spPr>
           <a:xfrm>
-            <a:off x="534908" y="746763"/>
-            <a:ext cx="4725022" cy="2112116"/>
+            <a:off x="568325" y="827884"/>
+            <a:ext cx="5020204" cy="2341558"/>
           </a:xfrm>
         </p:spPr>
         <p:txBody>
           <a:bodyPr/>
           <a:lstStyle>
             <a:lvl1pPr>
-              <a:defRPr sz="2700"/>
+              <a:defRPr sz="2869"/>
             </a:lvl1pPr>
             <a:lvl2pPr>
-              <a:defRPr sz="2300"/>
+              <a:defRPr sz="2444"/>
             </a:lvl2pPr>
             <a:lvl3pPr>
-              <a:defRPr sz="1900"/>
+              <a:defRPr sz="2019"/>
             </a:lvl3pPr>
             <a:lvl4pPr>
-              <a:defRPr sz="1800"/>
+              <a:defRPr sz="1913"/>
             </a:lvl4pPr>
             <a:lvl5pPr>
-              <a:defRPr sz="1800"/>
+              <a:defRPr sz="1913"/>
             </a:lvl5pPr>
             <a:lvl6pPr>
-              <a:defRPr sz="1800"/>
+              <a:defRPr sz="1913"/>
             </a:lvl6pPr>
             <a:lvl7pPr>
-              <a:defRPr sz="1800"/>
+              <a:defRPr sz="1913"/>
             </a:lvl7pPr>
             <a:lvl8pPr>
-              <a:defRPr sz="1800"/>
+              <a:defRPr sz="1913"/>
             </a:lvl8pPr>
             <a:lvl9pPr>
-              <a:defRPr sz="1800"/>
+              <a:defRPr sz="1913"/>
             </a:lvl9pPr>
           </a:lstStyle>
           <a:p>
             <a:pPr lvl="0"/>
             <a:r>
-              <a:rPr lang="en-US" smtClean="0"/>
+              <a:rPr lang="en-US"/>
               <a:t>Click to edit Master text styles</a:t>
             </a:r>
           </a:p>
           <a:p>
             <a:pPr lvl="1"/>
             <a:r>
-              <a:rPr lang="en-US" smtClean="0"/>
+              <a:rPr lang="en-US"/>
               <a:t>Second level</a:t>
             </a:r>
           </a:p>
           <a:p>
             <a:pPr lvl="2"/>
             <a:r>
-              <a:rPr lang="en-US" smtClean="0"/>
+              <a:rPr lang="en-US"/>
               <a:t>Third level</a:t>
             </a:r>
           </a:p>
           <a:p>
             <a:pPr lvl="3"/>
             <a:r>
-              <a:rPr lang="en-US" smtClean="0"/>
+              <a:rPr lang="en-US"/>
               <a:t>Fourth level</a:t>
             </a:r>
           </a:p>
           <a:p>
             <a:pPr lvl="4"/>
             <a:r>
-              <a:rPr lang="en-US" smtClean="0"/>
+              <a:rPr lang="en-US"/>
               <a:t>Fifth level</a:t>
             </a:r>
-            <a:endParaRPr lang="en-US"/>
           </a:p>
         </p:txBody>
       </p:sp>
@@ -1628,76 +1726,75 @@
         </p:nvSpPr>
         <p:spPr>
           <a:xfrm>
-            <a:off x="5438234" y="746763"/>
-            <a:ext cx="4725022" cy="2112116"/>
+            <a:off x="5777972" y="827884"/>
+            <a:ext cx="5020204" cy="2341558"/>
           </a:xfrm>
         </p:spPr>
         <p:txBody>
           <a:bodyPr/>
           <a:lstStyle>
             <a:lvl1pPr>
-              <a:defRPr sz="2700"/>
+              <a:defRPr sz="2869"/>
             </a:lvl1pPr>
             <a:lvl2pPr>
-              <a:defRPr sz="2300"/>
+              <a:defRPr sz="2444"/>
             </a:lvl2pPr>
             <a:lvl3pPr>
-              <a:defRPr sz="1900"/>
+              <a:defRPr sz="2019"/>
             </a:lvl3pPr>
             <a:lvl4pPr>
-              <a:defRPr sz="1800"/>
+              <a:defRPr sz="1913"/>
             </a:lvl4pPr>
             <a:lvl5pPr>
-              <a:defRPr sz="1800"/>
+              <a:defRPr sz="1913"/>
             </a:lvl5pPr>
             <a:lvl6pPr>
-              <a:defRPr sz="1800"/>
+              <a:defRPr sz="1913"/>
             </a:lvl6pPr>
             <a:lvl7pPr>
-              <a:defRPr sz="1800"/>
+              <a:defRPr sz="1913"/>
             </a:lvl7pPr>
             <a:lvl8pPr>
-              <a:defRPr sz="1800"/>
+              <a:defRPr sz="1913"/>
             </a:lvl8pPr>
             <a:lvl9pPr>
-              <a:defRPr sz="1800"/>
+              <a:defRPr sz="1913"/>
             </a:lvl9pPr>
           </a:lstStyle>
           <a:p>
             <a:pPr lvl="0"/>
             <a:r>
-              <a:rPr lang="en-US" smtClean="0"/>
+              <a:rPr lang="en-US"/>
               <a:t>Click to edit Master text styles</a:t>
             </a:r>
           </a:p>
           <a:p>
             <a:pPr lvl="1"/>
             <a:r>
-              <a:rPr lang="en-US" smtClean="0"/>
+              <a:rPr lang="en-US"/>
               <a:t>Second level</a:t>
             </a:r>
           </a:p>
           <a:p>
             <a:pPr lvl="2"/>
             <a:r>
-              <a:rPr lang="en-US" smtClean="0"/>
+              <a:rPr lang="en-US"/>
               <a:t>Third level</a:t>
             </a:r>
           </a:p>
           <a:p>
             <a:pPr lvl="3"/>
             <a:r>
-              <a:rPr lang="en-US" smtClean="0"/>
+              <a:rPr lang="en-US"/>
               <a:t>Fourth level</a:t>
             </a:r>
           </a:p>
           <a:p>
             <a:pPr lvl="4"/>
             <a:r>
-              <a:rPr lang="en-US" smtClean="0"/>
+              <a:rPr lang="en-US"/>
               <a:t>Fifth level</a:t>
             </a:r>
-            <a:endParaRPr lang="en-US"/>
           </a:p>
         </p:txBody>
       </p:sp>
@@ -1718,7 +1815,7 @@
           <a:p>
             <a:fld id="{5E1DB631-D0B3-B145-A691-00AE099C1923}" type="datetimeFigureOut">
               <a:rPr lang="en-US" smtClean="0"/>
-              <a:t>8/7/15</a:t>
+              <a:t>8/5/19</a:t>
             </a:fld>
             <a:endParaRPr lang="en-US"/>
           </a:p>
@@ -1816,10 +1913,9 @@
           </a:lstStyle>
           <a:p>
             <a:r>
-              <a:rPr lang="en-US" smtClean="0"/>
+              <a:rPr lang="en-US"/>
               <a:t>Click to edit Master title style</a:t>
             </a:r>
-            <a:endParaRPr lang="en-US"/>
           </a:p>
         </p:txBody>
       </p:sp>
@@ -1835,8 +1931,8 @@
         </p:nvSpPr>
         <p:spPr>
           <a:xfrm>
-            <a:off x="534908" y="716387"/>
-            <a:ext cx="4726880" cy="298556"/>
+            <a:off x="568325" y="794209"/>
+            <a:ext cx="5022178" cy="330988"/>
           </a:xfrm>
         </p:spPr>
         <p:txBody>
@@ -1844,45 +1940,45 @@
           <a:lstStyle>
             <a:lvl1pPr marL="0" indent="0">
               <a:buNone/>
-              <a:defRPr sz="2300" b="1"/>
+              <a:defRPr sz="2444" b="1"/>
             </a:lvl1pPr>
-            <a:lvl2pPr marL="445404" indent="0">
-              <a:buNone/>
-              <a:defRPr sz="1900" b="1"/>
+            <a:lvl2pPr marL="473242" indent="0">
+              <a:buNone/>
+              <a:defRPr sz="2019" b="1"/>
             </a:lvl2pPr>
-            <a:lvl3pPr marL="890808" indent="0">
-              <a:buNone/>
-              <a:defRPr sz="1800" b="1"/>
+            <a:lvl3pPr marL="946484" indent="0">
+              <a:buNone/>
+              <a:defRPr sz="1913" b="1"/>
             </a:lvl3pPr>
-            <a:lvl4pPr marL="1336213" indent="0">
-              <a:buNone/>
-              <a:defRPr sz="1600" b="1"/>
+            <a:lvl4pPr marL="1419726" indent="0">
+              <a:buNone/>
+              <a:defRPr sz="1700" b="1"/>
             </a:lvl4pPr>
-            <a:lvl5pPr marL="1781617" indent="0">
-              <a:buNone/>
-              <a:defRPr sz="1600" b="1"/>
+            <a:lvl5pPr marL="1892968" indent="0">
+              <a:buNone/>
+              <a:defRPr sz="1700" b="1"/>
             </a:lvl5pPr>
-            <a:lvl6pPr marL="2227021" indent="0">
-              <a:buNone/>
-              <a:defRPr sz="1600" b="1"/>
+            <a:lvl6pPr marL="2366210" indent="0">
+              <a:buNone/>
+              <a:defRPr sz="1700" b="1"/>
             </a:lvl6pPr>
-            <a:lvl7pPr marL="2672425" indent="0">
-              <a:buNone/>
-              <a:defRPr sz="1600" b="1"/>
+            <a:lvl7pPr marL="2839452" indent="0">
+              <a:buNone/>
+              <a:defRPr sz="1700" b="1"/>
             </a:lvl7pPr>
-            <a:lvl8pPr marL="3117830" indent="0">
-              <a:buNone/>
-              <a:defRPr sz="1600" b="1"/>
+            <a:lvl8pPr marL="3312694" indent="0">
+              <a:buNone/>
+              <a:defRPr sz="1700" b="1"/>
             </a:lvl8pPr>
-            <a:lvl9pPr marL="3563234" indent="0">
-              <a:buNone/>
-              <a:defRPr sz="1600" b="1"/>
+            <a:lvl9pPr marL="3785936" indent="0">
+              <a:buNone/>
+              <a:defRPr sz="1700" b="1"/>
             </a:lvl9pPr>
           </a:lstStyle>
           <a:p>
             <a:pPr lvl="0"/>
             <a:r>
-              <a:rPr lang="en-US" smtClean="0"/>
+              <a:rPr lang="en-US"/>
               <a:t>Click to edit Master text styles</a:t>
             </a:r>
           </a:p>
@@ -1900,76 +1996,75 @@
         </p:nvSpPr>
         <p:spPr>
           <a:xfrm>
-            <a:off x="534908" y="1014941"/>
-            <a:ext cx="4726880" cy="1843934"/>
+            <a:off x="568325" y="1125195"/>
+            <a:ext cx="5022178" cy="2044243"/>
           </a:xfrm>
         </p:spPr>
         <p:txBody>
           <a:bodyPr/>
           <a:lstStyle>
             <a:lvl1pPr>
-              <a:defRPr sz="2300"/>
+              <a:defRPr sz="2444"/>
             </a:lvl1pPr>
             <a:lvl2pPr>
-              <a:defRPr sz="1900"/>
+              <a:defRPr sz="2019"/>
             </a:lvl2pPr>
             <a:lvl3pPr>
-              <a:defRPr sz="1800"/>
+              <a:defRPr sz="1913"/>
             </a:lvl3pPr>
             <a:lvl4pPr>
-              <a:defRPr sz="1600"/>
+              <a:defRPr sz="1700"/>
             </a:lvl4pPr>
             <a:lvl5pPr>
-              <a:defRPr sz="1600"/>
+              <a:defRPr sz="1700"/>
             </a:lvl5pPr>
             <a:lvl6pPr>
-              <a:defRPr sz="1600"/>
+              <a:defRPr sz="1700"/>
             </a:lvl6pPr>
             <a:lvl7pPr>
-              <a:defRPr sz="1600"/>
+              <a:defRPr sz="1700"/>
             </a:lvl7pPr>
             <a:lvl8pPr>
-              <a:defRPr sz="1600"/>
+              <a:defRPr sz="1700"/>
             </a:lvl8pPr>
             <a:lvl9pPr>
-              <a:defRPr sz="1600"/>
+              <a:defRPr sz="1700"/>
             </a:lvl9pPr>
           </a:lstStyle>
           <a:p>
             <a:pPr lvl="0"/>
             <a:r>
-              <a:rPr lang="en-US" smtClean="0"/>
+              <a:rPr lang="en-US"/>
               <a:t>Click to edit Master text styles</a:t>
             </a:r>
           </a:p>
           <a:p>
             <a:pPr lvl="1"/>
             <a:r>
-              <a:rPr lang="en-US" smtClean="0"/>
+              <a:rPr lang="en-US"/>
               <a:t>Second level</a:t>
             </a:r>
           </a:p>
           <a:p>
             <a:pPr lvl="2"/>
             <a:r>
-              <a:rPr lang="en-US" smtClean="0"/>
+              <a:rPr lang="en-US"/>
               <a:t>Third level</a:t>
             </a:r>
           </a:p>
           <a:p>
             <a:pPr lvl="3"/>
             <a:r>
-              <a:rPr lang="en-US" smtClean="0"/>
+              <a:rPr lang="en-US"/>
               <a:t>Fourth level</a:t>
             </a:r>
           </a:p>
           <a:p>
             <a:pPr lvl="4"/>
             <a:r>
-              <a:rPr lang="en-US" smtClean="0"/>
+              <a:rPr lang="en-US"/>
               <a:t>Fifth level</a:t>
             </a:r>
-            <a:endParaRPr lang="en-US"/>
           </a:p>
         </p:txBody>
       </p:sp>
@@ -1985,8 +2080,8 @@
         </p:nvSpPr>
         <p:spPr>
           <a:xfrm>
-            <a:off x="5434520" y="716387"/>
-            <a:ext cx="4728737" cy="298556"/>
+            <a:off x="5774027" y="794209"/>
+            <a:ext cx="5024151" cy="330988"/>
           </a:xfrm>
         </p:spPr>
         <p:txBody>
@@ -1994,45 +2089,45 @@
           <a:lstStyle>
             <a:lvl1pPr marL="0" indent="0">
               <a:buNone/>
-              <a:defRPr sz="2300" b="1"/>
+              <a:defRPr sz="2444" b="1"/>
             </a:lvl1pPr>
-            <a:lvl2pPr marL="445404" indent="0">
-              <a:buNone/>
-              <a:defRPr sz="1900" b="1"/>
+            <a:lvl2pPr marL="473242" indent="0">
+              <a:buNone/>
+              <a:defRPr sz="2019" b="1"/>
             </a:lvl2pPr>
-            <a:lvl3pPr marL="890808" indent="0">
-              <a:buNone/>
-              <a:defRPr sz="1800" b="1"/>
+            <a:lvl3pPr marL="946484" indent="0">
+              <a:buNone/>
+              <a:defRPr sz="1913" b="1"/>
             </a:lvl3pPr>
-            <a:lvl4pPr marL="1336213" indent="0">
-              <a:buNone/>
-              <a:defRPr sz="1600" b="1"/>
+            <a:lvl4pPr marL="1419726" indent="0">
+              <a:buNone/>
+              <a:defRPr sz="1700" b="1"/>
             </a:lvl4pPr>
-            <a:lvl5pPr marL="1781617" indent="0">
-              <a:buNone/>
-              <a:defRPr sz="1600" b="1"/>
+            <a:lvl5pPr marL="1892968" indent="0">
+              <a:buNone/>
+              <a:defRPr sz="1700" b="1"/>
             </a:lvl5pPr>
-            <a:lvl6pPr marL="2227021" indent="0">
-              <a:buNone/>
-              <a:defRPr sz="1600" b="1"/>
+            <a:lvl6pPr marL="2366210" indent="0">
+              <a:buNone/>
+              <a:defRPr sz="1700" b="1"/>
             </a:lvl6pPr>
-            <a:lvl7pPr marL="2672425" indent="0">
-              <a:buNone/>
-              <a:defRPr sz="1600" b="1"/>
+            <a:lvl7pPr marL="2839452" indent="0">
+              <a:buNone/>
+              <a:defRPr sz="1700" b="1"/>
             </a:lvl7pPr>
-            <a:lvl8pPr marL="3117830" indent="0">
-              <a:buNone/>
-              <a:defRPr sz="1600" b="1"/>
+            <a:lvl8pPr marL="3312694" indent="0">
+              <a:buNone/>
+              <a:defRPr sz="1700" b="1"/>
             </a:lvl8pPr>
-            <a:lvl9pPr marL="3563234" indent="0">
-              <a:buNone/>
-              <a:defRPr sz="1600" b="1"/>
+            <a:lvl9pPr marL="3785936" indent="0">
+              <a:buNone/>
+              <a:defRPr sz="1700" b="1"/>
             </a:lvl9pPr>
           </a:lstStyle>
           <a:p>
             <a:pPr lvl="0"/>
             <a:r>
-              <a:rPr lang="en-US" smtClean="0"/>
+              <a:rPr lang="en-US"/>
               <a:t>Click to edit Master text styles</a:t>
             </a:r>
           </a:p>
@@ -2050,76 +2145,75 @@
         </p:nvSpPr>
         <p:spPr>
           <a:xfrm>
-            <a:off x="5434520" y="1014941"/>
-            <a:ext cx="4728737" cy="1843934"/>
+            <a:off x="5774027" y="1125195"/>
+            <a:ext cx="5024151" cy="2044243"/>
           </a:xfrm>
         </p:spPr>
         <p:txBody>
           <a:bodyPr/>
           <a:lstStyle>
             <a:lvl1pPr>
-              <a:defRPr sz="2300"/>
+              <a:defRPr sz="2444"/>
             </a:lvl1pPr>
             <a:lvl2pPr>
-              <a:defRPr sz="1900"/>
+              <a:defRPr sz="2019"/>
             </a:lvl2pPr>
             <a:lvl3pPr>
-              <a:defRPr sz="1800"/>
+              <a:defRPr sz="1913"/>
             </a:lvl3pPr>
             <a:lvl4pPr>
-              <a:defRPr sz="1600"/>
+              <a:defRPr sz="1700"/>
             </a:lvl4pPr>
             <a:lvl5pPr>
-              <a:defRPr sz="1600"/>
+              <a:defRPr sz="1700"/>
             </a:lvl5pPr>
             <a:lvl6pPr>
-              <a:defRPr sz="1600"/>
+              <a:defRPr sz="1700"/>
             </a:lvl6pPr>
             <a:lvl7pPr>
-              <a:defRPr sz="1600"/>
+              <a:defRPr sz="1700"/>
             </a:lvl7pPr>
             <a:lvl8pPr>
-              <a:defRPr sz="1600"/>
+              <a:defRPr sz="1700"/>
             </a:lvl8pPr>
             <a:lvl9pPr>
-              <a:defRPr sz="1600"/>
+              <a:defRPr sz="1700"/>
             </a:lvl9pPr>
           </a:lstStyle>
           <a:p>
             <a:pPr lvl="0"/>
             <a:r>
-              <a:rPr lang="en-US" smtClean="0"/>
+              <a:rPr lang="en-US"/>
               <a:t>Click to edit Master text styles</a:t>
             </a:r>
           </a:p>
           <a:p>
             <a:pPr lvl="1"/>
             <a:r>
-              <a:rPr lang="en-US" smtClean="0"/>
+              <a:rPr lang="en-US"/>
               <a:t>Second level</a:t>
             </a:r>
           </a:p>
           <a:p>
             <a:pPr lvl="2"/>
             <a:r>
-              <a:rPr lang="en-US" smtClean="0"/>
+              <a:rPr lang="en-US"/>
               <a:t>Third level</a:t>
             </a:r>
           </a:p>
           <a:p>
             <a:pPr lvl="3"/>
             <a:r>
-              <a:rPr lang="en-US" smtClean="0"/>
+              <a:rPr lang="en-US"/>
               <a:t>Fourth level</a:t>
             </a:r>
           </a:p>
           <a:p>
             <a:pPr lvl="4"/>
             <a:r>
-              <a:rPr lang="en-US" smtClean="0"/>
+              <a:rPr lang="en-US"/>
               <a:t>Fifth level</a:t>
             </a:r>
-            <a:endParaRPr lang="en-US"/>
           </a:p>
         </p:txBody>
       </p:sp>
@@ -2140,7 +2234,7 @@
           <a:p>
             <a:fld id="{5E1DB631-D0B3-B145-A691-00AE099C1923}" type="datetimeFigureOut">
               <a:rPr lang="en-US" smtClean="0"/>
-              <a:t>8/7/15</a:t>
+              <a:t>8/5/19</a:t>
             </a:fld>
             <a:endParaRPr lang="en-US"/>
           </a:p>
@@ -2234,10 +2328,9 @@
           <a:lstStyle/>
           <a:p>
             <a:r>
-              <a:rPr lang="en-US" smtClean="0"/>
+              <a:rPr lang="en-US"/>
               <a:t>Click to edit Master title style</a:t>
             </a:r>
-            <a:endParaRPr lang="en-US"/>
           </a:p>
         </p:txBody>
       </p:sp>
@@ -2258,7 +2351,7 @@
           <a:p>
             <a:fld id="{5E1DB631-D0B3-B145-A691-00AE099C1923}" type="datetimeFigureOut">
               <a:rPr lang="en-US" smtClean="0"/>
-              <a:t>8/7/15</a:t>
+              <a:t>8/5/19</a:t>
             </a:fld>
             <a:endParaRPr lang="en-US"/>
           </a:p>
@@ -2353,7 +2446,7 @@
           <a:p>
             <a:fld id="{5E1DB631-D0B3-B145-A691-00AE099C1923}" type="datetimeFigureOut">
               <a:rPr lang="en-US" smtClean="0"/>
-              <a:t>8/7/15</a:t>
+              <a:t>8/5/19</a:t>
             </a:fld>
             <a:endParaRPr lang="en-US"/>
           </a:p>
@@ -2443,23 +2536,22 @@
         </p:nvSpPr>
         <p:spPr>
           <a:xfrm>
-            <a:off x="534909" y="127423"/>
-            <a:ext cx="3519622" cy="542290"/>
+            <a:off x="568326" y="141265"/>
+            <a:ext cx="3739500" cy="601200"/>
           </a:xfrm>
         </p:spPr>
         <p:txBody>
           <a:bodyPr anchor="b"/>
           <a:lstStyle>
             <a:lvl1pPr algn="l">
-              <a:defRPr sz="1900" b="1"/>
+              <a:defRPr sz="2019" b="1"/>
             </a:lvl1pPr>
           </a:lstStyle>
           <a:p>
             <a:r>
-              <a:rPr lang="en-US" smtClean="0"/>
+              <a:rPr lang="en-US"/>
               <a:t>Click to edit Master title style</a:t>
             </a:r>
-            <a:endParaRPr lang="en-US"/>
           </a:p>
         </p:txBody>
       </p:sp>
@@ -2475,76 +2567,75 @@
         </p:nvSpPr>
         <p:spPr>
           <a:xfrm>
-            <a:off x="4182685" y="127424"/>
-            <a:ext cx="5980570" cy="2731453"/>
+            <a:off x="4443986" y="141267"/>
+            <a:ext cx="6354189" cy="3028174"/>
           </a:xfrm>
         </p:spPr>
         <p:txBody>
           <a:bodyPr/>
           <a:lstStyle>
             <a:lvl1pPr>
-              <a:defRPr sz="3100"/>
+              <a:defRPr sz="3294"/>
             </a:lvl1pPr>
             <a:lvl2pPr>
-              <a:defRPr sz="2700"/>
+              <a:defRPr sz="2869"/>
             </a:lvl2pPr>
             <a:lvl3pPr>
-              <a:defRPr sz="2300"/>
+              <a:defRPr sz="2444"/>
             </a:lvl3pPr>
             <a:lvl4pPr>
-              <a:defRPr sz="1900"/>
+              <a:defRPr sz="2019"/>
             </a:lvl4pPr>
             <a:lvl5pPr>
-              <a:defRPr sz="1900"/>
+              <a:defRPr sz="2019"/>
             </a:lvl5pPr>
             <a:lvl6pPr>
-              <a:defRPr sz="1900"/>
+              <a:defRPr sz="2019"/>
             </a:lvl6pPr>
             <a:lvl7pPr>
-              <a:defRPr sz="1900"/>
+              <a:defRPr sz="2019"/>
             </a:lvl7pPr>
             <a:lvl8pPr>
-              <a:defRPr sz="1900"/>
+              <a:defRPr sz="2019"/>
             </a:lvl8pPr>
             <a:lvl9pPr>
-              <a:defRPr sz="1900"/>
+              <a:defRPr sz="2019"/>
             </a:lvl9pPr>
           </a:lstStyle>
           <a:p>
             <a:pPr lvl="0"/>
             <a:r>
-              <a:rPr lang="en-US" smtClean="0"/>
+              <a:rPr lang="en-US"/>
               <a:t>Click to edit Master text styles</a:t>
             </a:r>
           </a:p>
           <a:p>
             <a:pPr lvl="1"/>
             <a:r>
-              <a:rPr lang="en-US" smtClean="0"/>
+              <a:rPr lang="en-US"/>
               <a:t>Second level</a:t>
             </a:r>
           </a:p>
           <a:p>
             <a:pPr lvl="2"/>
             <a:r>
-              <a:rPr lang="en-US" smtClean="0"/>
+              <a:rPr lang="en-US"/>
               <a:t>Third level</a:t>
             </a:r>
           </a:p>
           <a:p>
             <a:pPr lvl="3"/>
             <a:r>
-              <a:rPr lang="en-US" smtClean="0"/>
+              <a:rPr lang="en-US"/>
               <a:t>Fourth level</a:t>
             </a:r>
           </a:p>
           <a:p>
             <a:pPr lvl="4"/>
             <a:r>
-              <a:rPr lang="en-US" smtClean="0"/>
+              <a:rPr lang="en-US"/>
               <a:t>Fifth level</a:t>
             </a:r>
-            <a:endParaRPr lang="en-US"/>
           </a:p>
         </p:txBody>
       </p:sp>
@@ -2560,8 +2651,8 @@
         </p:nvSpPr>
         <p:spPr>
           <a:xfrm>
-            <a:off x="534909" y="669715"/>
-            <a:ext cx="3519622" cy="2189163"/>
+            <a:off x="568326" y="742468"/>
+            <a:ext cx="3739500" cy="2426974"/>
           </a:xfrm>
         </p:spPr>
         <p:txBody>
@@ -2569,45 +2660,45 @@
           <a:lstStyle>
             <a:lvl1pPr marL="0" indent="0">
               <a:buNone/>
-              <a:defRPr sz="1400"/>
+              <a:defRPr sz="1488"/>
             </a:lvl1pPr>
-            <a:lvl2pPr marL="445404" indent="0">
-              <a:buNone/>
-              <a:defRPr sz="1200"/>
+            <a:lvl2pPr marL="473242" indent="0">
+              <a:buNone/>
+              <a:defRPr sz="1275"/>
             </a:lvl2pPr>
-            <a:lvl3pPr marL="890808" indent="0">
-              <a:buNone/>
-              <a:defRPr sz="1000"/>
+            <a:lvl3pPr marL="946484" indent="0">
+              <a:buNone/>
+              <a:defRPr sz="1063"/>
             </a:lvl3pPr>
-            <a:lvl4pPr marL="1336213" indent="0">
-              <a:buNone/>
-              <a:defRPr sz="900"/>
+            <a:lvl4pPr marL="1419726" indent="0">
+              <a:buNone/>
+              <a:defRPr sz="956"/>
             </a:lvl4pPr>
-            <a:lvl5pPr marL="1781617" indent="0">
-              <a:buNone/>
-              <a:defRPr sz="900"/>
+            <a:lvl5pPr marL="1892968" indent="0">
+              <a:buNone/>
+              <a:defRPr sz="956"/>
             </a:lvl5pPr>
-            <a:lvl6pPr marL="2227021" indent="0">
-              <a:buNone/>
-              <a:defRPr sz="900"/>
+            <a:lvl6pPr marL="2366210" indent="0">
+              <a:buNone/>
+              <a:defRPr sz="956"/>
             </a:lvl6pPr>
-            <a:lvl7pPr marL="2672425" indent="0">
-              <a:buNone/>
-              <a:defRPr sz="900"/>
+            <a:lvl7pPr marL="2839452" indent="0">
+              <a:buNone/>
+              <a:defRPr sz="956"/>
             </a:lvl7pPr>
-            <a:lvl8pPr marL="3117830" indent="0">
-              <a:buNone/>
-              <a:defRPr sz="900"/>
+            <a:lvl8pPr marL="3312694" indent="0">
+              <a:buNone/>
+              <a:defRPr sz="956"/>
             </a:lvl8pPr>
-            <a:lvl9pPr marL="3563234" indent="0">
-              <a:buNone/>
-              <a:defRPr sz="900"/>
+            <a:lvl9pPr marL="3785936" indent="0">
+              <a:buNone/>
+              <a:defRPr sz="956"/>
             </a:lvl9pPr>
           </a:lstStyle>
           <a:p>
             <a:pPr lvl="0"/>
             <a:r>
-              <a:rPr lang="en-US" smtClean="0"/>
+              <a:rPr lang="en-US"/>
               <a:t>Click to edit Master text styles</a:t>
             </a:r>
           </a:p>
@@ -2630,7 +2721,7 @@
           <a:p>
             <a:fld id="{5E1DB631-D0B3-B145-A691-00AE099C1923}" type="datetimeFigureOut">
               <a:rPr lang="en-US" smtClean="0"/>
-              <a:t>8/7/15</a:t>
+              <a:t>8/5/19</a:t>
             </a:fld>
             <a:endParaRPr lang="en-US"/>
           </a:p>
@@ -2720,23 +2811,22 @@
         </p:nvSpPr>
         <p:spPr>
           <a:xfrm>
-            <a:off x="2096915" y="2240282"/>
-            <a:ext cx="6418898" cy="264478"/>
+            <a:off x="2227914" y="2483646"/>
+            <a:ext cx="6819900" cy="293209"/>
           </a:xfrm>
         </p:spPr>
         <p:txBody>
           <a:bodyPr anchor="b"/>
           <a:lstStyle>
             <a:lvl1pPr algn="l">
-              <a:defRPr sz="1900" b="1"/>
+              <a:defRPr sz="2019" b="1"/>
             </a:lvl1pPr>
           </a:lstStyle>
           <a:p>
             <a:r>
-              <a:rPr lang="en-US" smtClean="0"/>
+              <a:rPr lang="en-US"/>
               <a:t>Click to edit Master title style</a:t>
             </a:r>
-            <a:endParaRPr lang="en-US"/>
           </a:p>
         </p:txBody>
       </p:sp>
@@ -2752,8 +2842,8 @@
         </p:nvSpPr>
         <p:spPr>
           <a:xfrm>
-            <a:off x="2096915" y="285964"/>
-            <a:ext cx="6418898" cy="1920240"/>
+            <a:off x="2227914" y="317028"/>
+            <a:ext cx="6819900" cy="2128838"/>
           </a:xfrm>
         </p:spPr>
         <p:txBody>
@@ -2761,47 +2851,46 @@
           <a:lstStyle>
             <a:lvl1pPr marL="0" indent="0">
               <a:buNone/>
-              <a:defRPr sz="3100"/>
+              <a:defRPr sz="3294"/>
             </a:lvl1pPr>
-            <a:lvl2pPr marL="445404" indent="0">
-              <a:buNone/>
-              <a:defRPr sz="2700"/>
+            <a:lvl2pPr marL="473242" indent="0">
+              <a:buNone/>
+              <a:defRPr sz="2869"/>
             </a:lvl2pPr>
-            <a:lvl3pPr marL="890808" indent="0">
-              <a:buNone/>
-              <a:defRPr sz="2300"/>
+            <a:lvl3pPr marL="946484" indent="0">
+              <a:buNone/>
+              <a:defRPr sz="2444"/>
             </a:lvl3pPr>
-            <a:lvl4pPr marL="1336213" indent="0">
-              <a:buNone/>
-              <a:defRPr sz="1900"/>
+            <a:lvl4pPr marL="1419726" indent="0">
+              <a:buNone/>
+              <a:defRPr sz="2019"/>
             </a:lvl4pPr>
-            <a:lvl5pPr marL="1781617" indent="0">
-              <a:buNone/>
-              <a:defRPr sz="1900"/>
+            <a:lvl5pPr marL="1892968" indent="0">
+              <a:buNone/>
+              <a:defRPr sz="2019"/>
             </a:lvl5pPr>
-            <a:lvl6pPr marL="2227021" indent="0">
-              <a:buNone/>
-              <a:defRPr sz="1900"/>
+            <a:lvl6pPr marL="2366210" indent="0">
+              <a:buNone/>
+              <a:defRPr sz="2019"/>
             </a:lvl6pPr>
-            <a:lvl7pPr marL="2672425" indent="0">
-              <a:buNone/>
-              <a:defRPr sz="1900"/>
+            <a:lvl7pPr marL="2839452" indent="0">
+              <a:buNone/>
+              <a:defRPr sz="2019"/>
             </a:lvl7pPr>
-            <a:lvl8pPr marL="3117830" indent="0">
-              <a:buNone/>
-              <a:defRPr sz="1900"/>
+            <a:lvl8pPr marL="3312694" indent="0">
+              <a:buNone/>
+              <a:defRPr sz="2019"/>
             </a:lvl8pPr>
-            <a:lvl9pPr marL="3563234" indent="0">
-              <a:buNone/>
-              <a:defRPr sz="1900"/>
+            <a:lvl9pPr marL="3785936" indent="0">
+              <a:buNone/>
+              <a:defRPr sz="2019"/>
             </a:lvl9pPr>
           </a:lstStyle>
           <a:p>
             <a:r>
-              <a:rPr lang="en-US" smtClean="0"/>
+              <a:rPr lang="en-US"/>
               <a:t>Drag picture to placeholder or click icon to add</a:t>
             </a:r>
-            <a:endParaRPr lang="en-US"/>
           </a:p>
         </p:txBody>
       </p:sp>
@@ -2817,8 +2906,8 @@
         </p:nvSpPr>
         <p:spPr>
           <a:xfrm>
-            <a:off x="2096915" y="2504758"/>
-            <a:ext cx="6418898" cy="375602"/>
+            <a:off x="2227914" y="2776853"/>
+            <a:ext cx="6819900" cy="416404"/>
           </a:xfrm>
         </p:spPr>
         <p:txBody>
@@ -2826,45 +2915,45 @@
           <a:lstStyle>
             <a:lvl1pPr marL="0" indent="0">
               <a:buNone/>
-              <a:defRPr sz="1400"/>
+              <a:defRPr sz="1488"/>
             </a:lvl1pPr>
-            <a:lvl2pPr marL="445404" indent="0">
-              <a:buNone/>
-              <a:defRPr sz="1200"/>
+            <a:lvl2pPr marL="473242" indent="0">
+              <a:buNone/>
+              <a:defRPr sz="1275"/>
             </a:lvl2pPr>
-            <a:lvl3pPr marL="890808" indent="0">
-              <a:buNone/>
-              <a:defRPr sz="1000"/>
+            <a:lvl3pPr marL="946484" indent="0">
+              <a:buNone/>
+              <a:defRPr sz="1063"/>
             </a:lvl3pPr>
-            <a:lvl4pPr marL="1336213" indent="0">
-              <a:buNone/>
-              <a:defRPr sz="900"/>
+            <a:lvl4pPr marL="1419726" indent="0">
+              <a:buNone/>
+              <a:defRPr sz="956"/>
             </a:lvl4pPr>
-            <a:lvl5pPr marL="1781617" indent="0">
-              <a:buNone/>
-              <a:defRPr sz="900"/>
+            <a:lvl5pPr marL="1892968" indent="0">
+              <a:buNone/>
+              <a:defRPr sz="956"/>
             </a:lvl5pPr>
-            <a:lvl6pPr marL="2227021" indent="0">
-              <a:buNone/>
-              <a:defRPr sz="900"/>
+            <a:lvl6pPr marL="2366210" indent="0">
+              <a:buNone/>
+              <a:defRPr sz="956"/>
             </a:lvl6pPr>
-            <a:lvl7pPr marL="2672425" indent="0">
-              <a:buNone/>
-              <a:defRPr sz="900"/>
+            <a:lvl7pPr marL="2839452" indent="0">
+              <a:buNone/>
+              <a:defRPr sz="956"/>
             </a:lvl7pPr>
-            <a:lvl8pPr marL="3117830" indent="0">
-              <a:buNone/>
-              <a:defRPr sz="900"/>
+            <a:lvl8pPr marL="3312694" indent="0">
+              <a:buNone/>
+              <a:defRPr sz="956"/>
             </a:lvl8pPr>
-            <a:lvl9pPr marL="3563234" indent="0">
-              <a:buNone/>
-              <a:defRPr sz="900"/>
+            <a:lvl9pPr marL="3785936" indent="0">
+              <a:buNone/>
+              <a:defRPr sz="956"/>
             </a:lvl9pPr>
           </a:lstStyle>
           <a:p>
             <a:pPr lvl="0"/>
             <a:r>
-              <a:rPr lang="en-US" smtClean="0"/>
+              <a:rPr lang="en-US"/>
               <a:t>Click to edit Master text styles</a:t>
             </a:r>
           </a:p>
@@ -2887,7 +2976,7 @@
           <a:p>
             <a:fld id="{5E1DB631-D0B3-B145-A691-00AE099C1923}" type="datetimeFigureOut">
               <a:rPr lang="en-US" smtClean="0"/>
-              <a:t>8/7/15</a:t>
+              <a:t>8/5/19</a:t>
             </a:fld>
             <a:endParaRPr lang="en-US"/>
           </a:p>
@@ -2982,8 +3071,8 @@
         </p:nvSpPr>
         <p:spPr>
           <a:xfrm>
-            <a:off x="534908" y="128165"/>
-            <a:ext cx="9628348" cy="533400"/>
+            <a:off x="568325" y="142088"/>
+            <a:ext cx="10229851" cy="591344"/>
           </a:xfrm>
           <a:prstGeom prst="rect">
             <a:avLst/>
@@ -2996,10 +3085,9 @@
           <a:lstStyle/>
           <a:p>
             <a:r>
-              <a:rPr lang="en-US" smtClean="0"/>
+              <a:rPr lang="en-US"/>
               <a:t>Click to edit Master title style</a:t>
             </a:r>
-            <a:endParaRPr lang="en-US"/>
           </a:p>
         </p:txBody>
       </p:sp>
@@ -3015,8 +3103,8 @@
         </p:nvSpPr>
         <p:spPr>
           <a:xfrm>
-            <a:off x="534908" y="746763"/>
-            <a:ext cx="9628348" cy="2112116"/>
+            <a:off x="568325" y="827884"/>
+            <a:ext cx="10229851" cy="2341558"/>
           </a:xfrm>
           <a:prstGeom prst="rect">
             <a:avLst/>
@@ -3030,38 +3118,37 @@
           <a:p>
             <a:pPr lvl="0"/>
             <a:r>
-              <a:rPr lang="en-US" smtClean="0"/>
+              <a:rPr lang="en-US"/>
               <a:t>Click to edit Master text styles</a:t>
             </a:r>
           </a:p>
           <a:p>
             <a:pPr lvl="1"/>
             <a:r>
-              <a:rPr lang="en-US" smtClean="0"/>
+              <a:rPr lang="en-US"/>
               <a:t>Second level</a:t>
             </a:r>
           </a:p>
           <a:p>
             <a:pPr lvl="2"/>
             <a:r>
-              <a:rPr lang="en-US" smtClean="0"/>
+              <a:rPr lang="en-US"/>
               <a:t>Third level</a:t>
             </a:r>
           </a:p>
           <a:p>
             <a:pPr lvl="3"/>
             <a:r>
-              <a:rPr lang="en-US" smtClean="0"/>
+              <a:rPr lang="en-US"/>
               <a:t>Fourth level</a:t>
             </a:r>
           </a:p>
           <a:p>
             <a:pPr lvl="4"/>
             <a:r>
-              <a:rPr lang="en-US" smtClean="0"/>
+              <a:rPr lang="en-US"/>
               <a:t>Fifth level</a:t>
             </a:r>
-            <a:endParaRPr lang="en-US"/>
           </a:p>
         </p:txBody>
       </p:sp>
@@ -3077,8 +3164,8 @@
         </p:nvSpPr>
         <p:spPr>
           <a:xfrm>
-            <a:off x="534908" y="2966297"/>
-            <a:ext cx="2496238" cy="170392"/>
+            <a:off x="568325" y="3288529"/>
+            <a:ext cx="2652183" cy="188902"/>
           </a:xfrm>
           <a:prstGeom prst="rect">
             <a:avLst/>
@@ -3088,7 +3175,7 @@
           <a:bodyPr vert="horz" lIns="89081" tIns="44540" rIns="89081" bIns="44540" rtlCol="0" anchor="ctr"/>
           <a:lstStyle>
             <a:lvl1pPr algn="l">
-              <a:defRPr sz="1200">
+              <a:defRPr sz="1275">
                 <a:solidFill>
                   <a:schemeClr val="tx1">
                     <a:tint val="75000"/>
@@ -3100,7 +3187,7 @@
           <a:p>
             <a:fld id="{5E1DB631-D0B3-B145-A691-00AE099C1923}" type="datetimeFigureOut">
               <a:rPr lang="en-US" smtClean="0"/>
-              <a:t>8/7/15</a:t>
+              <a:t>8/5/19</a:t>
             </a:fld>
             <a:endParaRPr lang="en-US"/>
           </a:p>
@@ -3118,8 +3205,8 @@
         </p:nvSpPr>
         <p:spPr>
           <a:xfrm>
-            <a:off x="3655206" y="2966297"/>
-            <a:ext cx="3387752" cy="170392"/>
+            <a:off x="3883555" y="3288529"/>
+            <a:ext cx="3599392" cy="188902"/>
           </a:xfrm>
           <a:prstGeom prst="rect">
             <a:avLst/>
@@ -3129,7 +3216,7 @@
           <a:bodyPr vert="horz" lIns="89081" tIns="44540" rIns="89081" bIns="44540" rtlCol="0" anchor="ctr"/>
           <a:lstStyle>
             <a:lvl1pPr algn="ctr">
-              <a:defRPr sz="1200">
+              <a:defRPr sz="1275">
                 <a:solidFill>
                   <a:schemeClr val="tx1">
                     <a:tint val="75000"/>
@@ -3155,8 +3242,8 @@
         </p:nvSpPr>
         <p:spPr>
           <a:xfrm>
-            <a:off x="7667017" y="2966297"/>
-            <a:ext cx="2496238" cy="170392"/>
+            <a:off x="8145992" y="3288529"/>
+            <a:ext cx="2652183" cy="188902"/>
           </a:xfrm>
           <a:prstGeom prst="rect">
             <a:avLst/>
@@ -3166,7 +3253,7 @@
           <a:bodyPr vert="horz" lIns="89081" tIns="44540" rIns="89081" bIns="44540" rtlCol="0" anchor="ctr"/>
           <a:lstStyle>
             <a:lvl1pPr algn="r">
-              <a:defRPr sz="1200">
+              <a:defRPr sz="1275">
                 <a:solidFill>
                   <a:schemeClr val="tx1">
                     <a:tint val="75000"/>
@@ -3207,12 +3294,12 @@
   </p:sldLayoutIdLst>
   <p:txStyles>
     <p:titleStyle>
-      <a:lvl1pPr algn="ctr" defTabSz="890808" rtl="0" eaLnBrk="1" latinLnBrk="0" hangingPunct="1">
+      <a:lvl1pPr algn="ctr" defTabSz="946484" rtl="0" eaLnBrk="1" latinLnBrk="0" hangingPunct="1">
         <a:spcBef>
           <a:spcPct val="0"/>
         </a:spcBef>
         <a:buNone/>
-        <a:defRPr sz="4300" kern="1200">
+        <a:defRPr sz="4569" kern="1200">
           <a:solidFill>
             <a:schemeClr val="tx1"/>
           </a:solidFill>
@@ -3223,13 +3310,13 @@
       </a:lvl1pPr>
     </p:titleStyle>
     <p:bodyStyle>
-      <a:lvl1pPr marL="334053" indent="-334053" algn="l" defTabSz="890808" rtl="0" eaLnBrk="1" latinLnBrk="0" hangingPunct="1">
+      <a:lvl1pPr marL="354931" indent="-354931" algn="l" defTabSz="946484" rtl="0" eaLnBrk="1" latinLnBrk="0" hangingPunct="1">
         <a:spcBef>
           <a:spcPct val="20000"/>
         </a:spcBef>
         <a:buFont typeface="Arial" pitchFamily="34" charset="0"/>
         <a:buChar char="•"/>
-        <a:defRPr sz="3100" kern="1200">
+        <a:defRPr sz="3294" kern="1200">
           <a:solidFill>
             <a:schemeClr val="tx1"/>
           </a:solidFill>
@@ -3238,13 +3325,13 @@
           <a:cs typeface="+mn-cs"/>
         </a:defRPr>
       </a:lvl1pPr>
-      <a:lvl2pPr marL="723782" indent="-278378" algn="l" defTabSz="890808" rtl="0" eaLnBrk="1" latinLnBrk="0" hangingPunct="1">
+      <a:lvl2pPr marL="769018" indent="-295777" algn="l" defTabSz="946484" rtl="0" eaLnBrk="1" latinLnBrk="0" hangingPunct="1">
         <a:spcBef>
           <a:spcPct val="20000"/>
         </a:spcBef>
         <a:buFont typeface="Arial" pitchFamily="34" charset="0"/>
         <a:buChar char="–"/>
-        <a:defRPr sz="2700" kern="1200">
+        <a:defRPr sz="2869" kern="1200">
           <a:solidFill>
             <a:schemeClr val="tx1"/>
           </a:solidFill>
@@ -3253,13 +3340,13 @@
           <a:cs typeface="+mn-cs"/>
         </a:defRPr>
       </a:lvl2pPr>
-      <a:lvl3pPr marL="1113511" indent="-222702" algn="l" defTabSz="890808" rtl="0" eaLnBrk="1" latinLnBrk="0" hangingPunct="1">
+      <a:lvl3pPr marL="1183105" indent="-236621" algn="l" defTabSz="946484" rtl="0" eaLnBrk="1" latinLnBrk="0" hangingPunct="1">
         <a:spcBef>
           <a:spcPct val="20000"/>
         </a:spcBef>
         <a:buFont typeface="Arial" pitchFamily="34" charset="0"/>
         <a:buChar char="•"/>
-        <a:defRPr sz="2300" kern="1200">
+        <a:defRPr sz="2444" kern="1200">
           <a:solidFill>
             <a:schemeClr val="tx1"/>
           </a:solidFill>
@@ -3268,13 +3355,13 @@
           <a:cs typeface="+mn-cs"/>
         </a:defRPr>
       </a:lvl3pPr>
-      <a:lvl4pPr marL="1558915" indent="-222702" algn="l" defTabSz="890808" rtl="0" eaLnBrk="1" latinLnBrk="0" hangingPunct="1">
+      <a:lvl4pPr marL="1656347" indent="-236621" algn="l" defTabSz="946484" rtl="0" eaLnBrk="1" latinLnBrk="0" hangingPunct="1">
         <a:spcBef>
           <a:spcPct val="20000"/>
         </a:spcBef>
         <a:buFont typeface="Arial" pitchFamily="34" charset="0"/>
         <a:buChar char="–"/>
-        <a:defRPr sz="1900" kern="1200">
+        <a:defRPr sz="2019" kern="1200">
           <a:solidFill>
             <a:schemeClr val="tx1"/>
           </a:solidFill>
@@ -3283,13 +3370,13 @@
           <a:cs typeface="+mn-cs"/>
         </a:defRPr>
       </a:lvl4pPr>
-      <a:lvl5pPr marL="2004319" indent="-222702" algn="l" defTabSz="890808" rtl="0" eaLnBrk="1" latinLnBrk="0" hangingPunct="1">
+      <a:lvl5pPr marL="2129589" indent="-236621" algn="l" defTabSz="946484" rtl="0" eaLnBrk="1" latinLnBrk="0" hangingPunct="1">
         <a:spcBef>
           <a:spcPct val="20000"/>
         </a:spcBef>
         <a:buFont typeface="Arial" pitchFamily="34" charset="0"/>
         <a:buChar char="»"/>
-        <a:defRPr sz="1900" kern="1200">
+        <a:defRPr sz="2019" kern="1200">
           <a:solidFill>
             <a:schemeClr val="tx1"/>
           </a:solidFill>
@@ -3298,13 +3385,13 @@
           <a:cs typeface="+mn-cs"/>
         </a:defRPr>
       </a:lvl5pPr>
-      <a:lvl6pPr marL="2449723" indent="-222702" algn="l" defTabSz="890808" rtl="0" eaLnBrk="1" latinLnBrk="0" hangingPunct="1">
+      <a:lvl6pPr marL="2602831" indent="-236621" algn="l" defTabSz="946484" rtl="0" eaLnBrk="1" latinLnBrk="0" hangingPunct="1">
         <a:spcBef>
           <a:spcPct val="20000"/>
         </a:spcBef>
         <a:buFont typeface="Arial" pitchFamily="34" charset="0"/>
         <a:buChar char="•"/>
-        <a:defRPr sz="1900" kern="1200">
+        <a:defRPr sz="2019" kern="1200">
           <a:solidFill>
             <a:schemeClr val="tx1"/>
           </a:solidFill>
@@ -3313,13 +3400,13 @@
           <a:cs typeface="+mn-cs"/>
         </a:defRPr>
       </a:lvl6pPr>
-      <a:lvl7pPr marL="2895128" indent="-222702" algn="l" defTabSz="890808" rtl="0" eaLnBrk="1" latinLnBrk="0" hangingPunct="1">
+      <a:lvl7pPr marL="3076074" indent="-236621" algn="l" defTabSz="946484" rtl="0" eaLnBrk="1" latinLnBrk="0" hangingPunct="1">
         <a:spcBef>
           <a:spcPct val="20000"/>
         </a:spcBef>
         <a:buFont typeface="Arial" pitchFamily="34" charset="0"/>
         <a:buChar char="•"/>
-        <a:defRPr sz="1900" kern="1200">
+        <a:defRPr sz="2019" kern="1200">
           <a:solidFill>
             <a:schemeClr val="tx1"/>
           </a:solidFill>
@@ -3328,13 +3415,13 @@
           <a:cs typeface="+mn-cs"/>
         </a:defRPr>
       </a:lvl7pPr>
-      <a:lvl8pPr marL="3340532" indent="-222702" algn="l" defTabSz="890808" rtl="0" eaLnBrk="1" latinLnBrk="0" hangingPunct="1">
+      <a:lvl8pPr marL="3549315" indent="-236621" algn="l" defTabSz="946484" rtl="0" eaLnBrk="1" latinLnBrk="0" hangingPunct="1">
         <a:spcBef>
           <a:spcPct val="20000"/>
         </a:spcBef>
         <a:buFont typeface="Arial" pitchFamily="34" charset="0"/>
         <a:buChar char="•"/>
-        <a:defRPr sz="1900" kern="1200">
+        <a:defRPr sz="2019" kern="1200">
           <a:solidFill>
             <a:schemeClr val="tx1"/>
           </a:solidFill>
@@ -3343,13 +3430,13 @@
           <a:cs typeface="+mn-cs"/>
         </a:defRPr>
       </a:lvl8pPr>
-      <a:lvl9pPr marL="3785936" indent="-222702" algn="l" defTabSz="890808" rtl="0" eaLnBrk="1" latinLnBrk="0" hangingPunct="1">
+      <a:lvl9pPr marL="4022557" indent="-236621" algn="l" defTabSz="946484" rtl="0" eaLnBrk="1" latinLnBrk="0" hangingPunct="1">
         <a:spcBef>
           <a:spcPct val="20000"/>
         </a:spcBef>
         <a:buFont typeface="Arial" pitchFamily="34" charset="0"/>
         <a:buChar char="•"/>
-        <a:defRPr sz="1900" kern="1200">
+        <a:defRPr sz="2019" kern="1200">
           <a:solidFill>
             <a:schemeClr val="tx1"/>
           </a:solidFill>
@@ -3363,8 +3450,8 @@
       <a:defPPr>
         <a:defRPr lang="en-US"/>
       </a:defPPr>
-      <a:lvl1pPr marL="0" algn="l" defTabSz="890808" rtl="0" eaLnBrk="1" latinLnBrk="0" hangingPunct="1">
-        <a:defRPr sz="1800" kern="1200">
+      <a:lvl1pPr marL="0" algn="l" defTabSz="946484" rtl="0" eaLnBrk="1" latinLnBrk="0" hangingPunct="1">
+        <a:defRPr sz="1913" kern="1200">
           <a:solidFill>
             <a:schemeClr val="tx1"/>
           </a:solidFill>
@@ -3373,8 +3460,8 @@
           <a:cs typeface="+mn-cs"/>
         </a:defRPr>
       </a:lvl1pPr>
-      <a:lvl2pPr marL="445404" algn="l" defTabSz="890808" rtl="0" eaLnBrk="1" latinLnBrk="0" hangingPunct="1">
-        <a:defRPr sz="1800" kern="1200">
+      <a:lvl2pPr marL="473242" algn="l" defTabSz="946484" rtl="0" eaLnBrk="1" latinLnBrk="0" hangingPunct="1">
+        <a:defRPr sz="1913" kern="1200">
           <a:solidFill>
             <a:schemeClr val="tx1"/>
           </a:solidFill>
@@ -3383,8 +3470,8 @@
           <a:cs typeface="+mn-cs"/>
         </a:defRPr>
       </a:lvl2pPr>
-      <a:lvl3pPr marL="890808" algn="l" defTabSz="890808" rtl="0" eaLnBrk="1" latinLnBrk="0" hangingPunct="1">
-        <a:defRPr sz="1800" kern="1200">
+      <a:lvl3pPr marL="946484" algn="l" defTabSz="946484" rtl="0" eaLnBrk="1" latinLnBrk="0" hangingPunct="1">
+        <a:defRPr sz="1913" kern="1200">
           <a:solidFill>
             <a:schemeClr val="tx1"/>
           </a:solidFill>
@@ -3393,8 +3480,8 @@
           <a:cs typeface="+mn-cs"/>
         </a:defRPr>
       </a:lvl3pPr>
-      <a:lvl4pPr marL="1336213" algn="l" defTabSz="890808" rtl="0" eaLnBrk="1" latinLnBrk="0" hangingPunct="1">
-        <a:defRPr sz="1800" kern="1200">
+      <a:lvl4pPr marL="1419726" algn="l" defTabSz="946484" rtl="0" eaLnBrk="1" latinLnBrk="0" hangingPunct="1">
+        <a:defRPr sz="1913" kern="1200">
           <a:solidFill>
             <a:schemeClr val="tx1"/>
           </a:solidFill>
@@ -3403,8 +3490,8 @@
           <a:cs typeface="+mn-cs"/>
         </a:defRPr>
       </a:lvl4pPr>
-      <a:lvl5pPr marL="1781617" algn="l" defTabSz="890808" rtl="0" eaLnBrk="1" latinLnBrk="0" hangingPunct="1">
-        <a:defRPr sz="1800" kern="1200">
+      <a:lvl5pPr marL="1892968" algn="l" defTabSz="946484" rtl="0" eaLnBrk="1" latinLnBrk="0" hangingPunct="1">
+        <a:defRPr sz="1913" kern="1200">
           <a:solidFill>
             <a:schemeClr val="tx1"/>
           </a:solidFill>
@@ -3413,8 +3500,8 @@
           <a:cs typeface="+mn-cs"/>
         </a:defRPr>
       </a:lvl5pPr>
-      <a:lvl6pPr marL="2227021" algn="l" defTabSz="890808" rtl="0" eaLnBrk="1" latinLnBrk="0" hangingPunct="1">
-        <a:defRPr sz="1800" kern="1200">
+      <a:lvl6pPr marL="2366210" algn="l" defTabSz="946484" rtl="0" eaLnBrk="1" latinLnBrk="0" hangingPunct="1">
+        <a:defRPr sz="1913" kern="1200">
           <a:solidFill>
             <a:schemeClr val="tx1"/>
           </a:solidFill>
@@ -3423,8 +3510,8 @@
           <a:cs typeface="+mn-cs"/>
         </a:defRPr>
       </a:lvl6pPr>
-      <a:lvl7pPr marL="2672425" algn="l" defTabSz="890808" rtl="0" eaLnBrk="1" latinLnBrk="0" hangingPunct="1">
-        <a:defRPr sz="1800" kern="1200">
+      <a:lvl7pPr marL="2839452" algn="l" defTabSz="946484" rtl="0" eaLnBrk="1" latinLnBrk="0" hangingPunct="1">
+        <a:defRPr sz="1913" kern="1200">
           <a:solidFill>
             <a:schemeClr val="tx1"/>
           </a:solidFill>
@@ -3433,8 +3520,8 @@
           <a:cs typeface="+mn-cs"/>
         </a:defRPr>
       </a:lvl7pPr>
-      <a:lvl8pPr marL="3117830" algn="l" defTabSz="890808" rtl="0" eaLnBrk="1" latinLnBrk="0" hangingPunct="1">
-        <a:defRPr sz="1800" kern="1200">
+      <a:lvl8pPr marL="3312694" algn="l" defTabSz="946484" rtl="0" eaLnBrk="1" latinLnBrk="0" hangingPunct="1">
+        <a:defRPr sz="1913" kern="1200">
           <a:solidFill>
             <a:schemeClr val="tx1"/>
           </a:solidFill>
@@ -3443,8 +3530,8 @@
           <a:cs typeface="+mn-cs"/>
         </a:defRPr>
       </a:lvl8pPr>
-      <a:lvl9pPr marL="3563234" algn="l" defTabSz="890808" rtl="0" eaLnBrk="1" latinLnBrk="0" hangingPunct="1">
-        <a:defRPr sz="1800" kern="1200">
+      <a:lvl9pPr marL="3785936" algn="l" defTabSz="946484" rtl="0" eaLnBrk="1" latinLnBrk="0" hangingPunct="1">
+        <a:defRPr sz="1913" kern="1200">
           <a:solidFill>
             <a:schemeClr val="tx1"/>
           </a:solidFill>
@@ -3485,13 +3572,6 @@
   <p:clrMapOvr>
     <a:masterClrMapping/>
   </p:clrMapOvr>
-  <p:timing>
-    <p:tnLst>
-      <p:par>
-        <p:cTn xmlns:p14="http://schemas.microsoft.com/office/powerpoint/2010/main" id="1" dur="indefinite" restart="never" nodeType="tmRoot"/>
-      </p:par>
-    </p:tnLst>
-  </p:timing>
 </p:sld>
 </file>
 

</xml_diff>

<commit_message>
fixed resolution of Creativity N wall: 3372x1200
</commit_message>
<xml_diff>
--- a/powerpoint/creativity_studio/creativity_north.pptx
+++ b/powerpoint/creativity_studio/creativity_north.pptx
@@ -10,7 +10,7 @@
   <p:sldIdLst>
     <p:sldId id="263" r:id="rId2"/>
   </p:sldIdLst>
-  <p:sldSz cx="11366500" cy="3548063"/>
+  <p:sldSz cx="9966325" cy="3548063"/>
   <p:notesSz cx="6858000" cy="9144000"/>
   <p:defaultTextStyle>
     <a:defPPr>
@@ -115,7 +115,7 @@
             <a:srgbClr val="A4A3A4"/>
           </p15:clr>
         </p15:guide>
-        <p15:guide id="2" pos="3856" userDrawn="1">
+        <p15:guide id="2" pos="3381" userDrawn="1">
           <p15:clr>
             <a:srgbClr val="A4A3A4"/>
           </p15:clr>
@@ -125,7 +125,7 @@
             <a:srgbClr val="A4A3A4"/>
           </p15:clr>
         </p15:guide>
-        <p15:guide id="4" pos="3581" userDrawn="1">
+        <p15:guide id="4" pos="3140" userDrawn="1">
           <p15:clr>
             <a:srgbClr val="A4A3A4"/>
           </p15:clr>
@@ -218,7 +218,7 @@
           <a:p>
             <a:fld id="{A8DD1C4E-17A0-2A4C-99D2-FAFEE8607A3F}" type="datetimeFigureOut">
               <a:rPr lang="en-US" smtClean="0"/>
-              <a:t>8/5/19</a:t>
+              <a:t>8/19/19</a:t>
             </a:fld>
             <a:endParaRPr lang="en-US"/>
           </a:p>
@@ -236,8 +236,8 @@
         </p:nvSpPr>
         <p:spPr>
           <a:xfrm>
-            <a:off x="-2063750" y="685800"/>
-            <a:ext cx="10985500" cy="3429000"/>
+            <a:off x="-1387475" y="685800"/>
+            <a:ext cx="9632950" cy="3429000"/>
           </a:xfrm>
           <a:prstGeom prst="rect">
             <a:avLst/>
@@ -512,7 +512,12 @@
             <p:ph type="sldImg"/>
           </p:nvPr>
         </p:nvSpPr>
-        <p:spPr/>
+        <p:spPr>
+          <a:xfrm>
+            <a:off x="-1387475" y="685800"/>
+            <a:ext cx="9632950" cy="3429000"/>
+          </a:xfrm>
+        </p:spPr>
       </p:sp>
       <p:sp>
         <p:nvSpPr>
@@ -535,7 +540,7 @@
             </a:r>
             <a:r>
               <a:rPr lang="en-US"/>
-              <a:t>North Wall: 3840px </a:t>
+              <a:t>North Wall: 3372px </a:t>
             </a:r>
             <a:r>
               <a:rPr lang="en-US" dirty="0"/>
@@ -614,8 +619,8 @@
         </p:nvSpPr>
         <p:spPr>
           <a:xfrm>
-            <a:off x="852487" y="1102200"/>
-            <a:ext cx="9661527" cy="760534"/>
+            <a:off x="747474" y="1102200"/>
+            <a:ext cx="8471378" cy="760534"/>
           </a:xfrm>
         </p:spPr>
         <p:txBody>
@@ -641,8 +646,8 @@
         </p:nvSpPr>
         <p:spPr>
           <a:xfrm>
-            <a:off x="1704976" y="2010569"/>
-            <a:ext cx="7956550" cy="906727"/>
+            <a:off x="1494949" y="2010570"/>
+            <a:ext cx="6976428" cy="906727"/>
           </a:xfrm>
         </p:spPr>
         <p:txBody>
@@ -658,7 +663,7 @@
                 </a:solidFill>
               </a:defRPr>
             </a:lvl1pPr>
-            <a:lvl2pPr marL="473242" indent="0" algn="ctr">
+            <a:lvl2pPr marL="414939" indent="0" algn="ctr">
               <a:buNone/>
               <a:defRPr>
                 <a:solidFill>
@@ -668,7 +673,7 @@
                 </a:solidFill>
               </a:defRPr>
             </a:lvl2pPr>
-            <a:lvl3pPr marL="946484" indent="0" algn="ctr">
+            <a:lvl3pPr marL="829877" indent="0" algn="ctr">
               <a:buNone/>
               <a:defRPr>
                 <a:solidFill>
@@ -678,7 +683,7 @@
                 </a:solidFill>
               </a:defRPr>
             </a:lvl3pPr>
-            <a:lvl4pPr marL="1419726" indent="0" algn="ctr">
+            <a:lvl4pPr marL="1244816" indent="0" algn="ctr">
               <a:buNone/>
               <a:defRPr>
                 <a:solidFill>
@@ -688,7 +693,7 @@
                 </a:solidFill>
               </a:defRPr>
             </a:lvl4pPr>
-            <a:lvl5pPr marL="1892968" indent="0" algn="ctr">
+            <a:lvl5pPr marL="1659754" indent="0" algn="ctr">
               <a:buNone/>
               <a:defRPr>
                 <a:solidFill>
@@ -698,7 +703,7 @@
                 </a:solidFill>
               </a:defRPr>
             </a:lvl5pPr>
-            <a:lvl6pPr marL="2366210" indent="0" algn="ctr">
+            <a:lvl6pPr marL="2074693" indent="0" algn="ctr">
               <a:buNone/>
               <a:defRPr>
                 <a:solidFill>
@@ -708,7 +713,7 @@
                 </a:solidFill>
               </a:defRPr>
             </a:lvl6pPr>
-            <a:lvl7pPr marL="2839452" indent="0" algn="ctr">
+            <a:lvl7pPr marL="2489632" indent="0" algn="ctr">
               <a:buNone/>
               <a:defRPr>
                 <a:solidFill>
@@ -718,7 +723,7 @@
                 </a:solidFill>
               </a:defRPr>
             </a:lvl7pPr>
-            <a:lvl8pPr marL="3312694" indent="0" algn="ctr">
+            <a:lvl8pPr marL="2904570" indent="0" algn="ctr">
               <a:buNone/>
               <a:defRPr>
                 <a:solidFill>
@@ -728,7 +733,7 @@
                 </a:solidFill>
               </a:defRPr>
             </a:lvl8pPr>
-            <a:lvl9pPr marL="3785936" indent="0" algn="ctr">
+            <a:lvl9pPr marL="3319509" indent="0" algn="ctr">
               <a:buNone/>
               <a:defRPr>
                 <a:solidFill>
@@ -764,7 +769,7 @@
           <a:p>
             <a:fld id="{5E1DB631-D0B3-B145-A691-00AE099C1923}" type="datetimeFigureOut">
               <a:rPr lang="en-US" smtClean="0"/>
-              <a:t>8/5/19</a:t>
+              <a:t>8/19/19</a:t>
             </a:fld>
             <a:endParaRPr lang="en-US"/>
           </a:p>
@@ -939,7 +944,7 @@
           <a:p>
             <a:fld id="{5E1DB631-D0B3-B145-A691-00AE099C1923}" type="datetimeFigureOut">
               <a:rPr lang="en-US" smtClean="0"/>
-              <a:t>8/5/19</a:t>
+              <a:t>8/19/19</a:t>
             </a:fld>
             <a:endParaRPr lang="en-US"/>
           </a:p>
@@ -1029,8 +1034,8 @@
         </p:nvSpPr>
         <p:spPr>
           <a:xfrm>
-            <a:off x="8240714" y="142088"/>
-            <a:ext cx="2557463" cy="3027352"/>
+            <a:off x="7225587" y="142088"/>
+            <a:ext cx="2242424" cy="3027352"/>
           </a:xfrm>
         </p:spPr>
         <p:txBody>
@@ -1056,8 +1061,8 @@
         </p:nvSpPr>
         <p:spPr>
           <a:xfrm>
-            <a:off x="568325" y="142088"/>
-            <a:ext cx="7482946" cy="3027352"/>
+            <a:off x="498316" y="142088"/>
+            <a:ext cx="6561164" cy="3027352"/>
           </a:xfrm>
         </p:spPr>
         <p:txBody>
@@ -1117,7 +1122,7 @@
           <a:p>
             <a:fld id="{5E1DB631-D0B3-B145-A691-00AE099C1923}" type="datetimeFigureOut">
               <a:rPr lang="en-US" smtClean="0"/>
-              <a:t>8/5/19</a:t>
+              <a:t>8/19/19</a:t>
             </a:fld>
             <a:endParaRPr lang="en-US"/>
           </a:p>
@@ -1285,7 +1290,7 @@
           <a:p>
             <a:fld id="{5E1DB631-D0B3-B145-A691-00AE099C1923}" type="datetimeFigureOut">
               <a:rPr lang="en-US" smtClean="0"/>
-              <a:t>8/5/19</a:t>
+              <a:t>8/19/19</a:t>
             </a:fld>
             <a:endParaRPr lang="en-US"/>
           </a:p>
@@ -1375,15 +1380,15 @@
         </p:nvSpPr>
         <p:spPr>
           <a:xfrm>
-            <a:off x="897876" y="2279959"/>
-            <a:ext cx="9661527" cy="704685"/>
+            <a:off x="787272" y="2279960"/>
+            <a:ext cx="8471378" cy="704685"/>
           </a:xfrm>
         </p:spPr>
         <p:txBody>
           <a:bodyPr anchor="t"/>
           <a:lstStyle>
             <a:lvl1pPr algn="l">
-              <a:defRPr sz="4144" b="1" cap="all"/>
+              <a:defRPr sz="3633" b="1" cap="all"/>
             </a:lvl1pPr>
           </a:lstStyle>
           <a:p>
@@ -1406,8 +1411,8 @@
         </p:nvSpPr>
         <p:spPr>
           <a:xfrm>
-            <a:off x="897876" y="1503823"/>
-            <a:ext cx="9661527" cy="776139"/>
+            <a:off x="787272" y="1503824"/>
+            <a:ext cx="8471378" cy="776139"/>
           </a:xfrm>
         </p:spPr>
         <p:txBody>
@@ -1415,7 +1420,7 @@
           <a:lstStyle>
             <a:lvl1pPr marL="0" indent="0">
               <a:buNone/>
-              <a:defRPr sz="2019">
+              <a:defRPr sz="1770">
                 <a:solidFill>
                   <a:schemeClr val="tx1">
                     <a:tint val="75000"/>
@@ -1423,9 +1428,9 @@
                 </a:solidFill>
               </a:defRPr>
             </a:lvl1pPr>
-            <a:lvl2pPr marL="473242" indent="0">
-              <a:buNone/>
-              <a:defRPr sz="1913">
+            <a:lvl2pPr marL="414939" indent="0">
+              <a:buNone/>
+              <a:defRPr sz="1677">
                 <a:solidFill>
                   <a:schemeClr val="tx1">
                     <a:tint val="75000"/>
@@ -1433,9 +1438,9 @@
                 </a:solidFill>
               </a:defRPr>
             </a:lvl2pPr>
-            <a:lvl3pPr marL="946484" indent="0">
-              <a:buNone/>
-              <a:defRPr sz="1700">
+            <a:lvl3pPr marL="829877" indent="0">
+              <a:buNone/>
+              <a:defRPr sz="1491">
                 <a:solidFill>
                   <a:schemeClr val="tx1">
                     <a:tint val="75000"/>
@@ -1443,9 +1448,9 @@
                 </a:solidFill>
               </a:defRPr>
             </a:lvl3pPr>
-            <a:lvl4pPr marL="1419726" indent="0">
-              <a:buNone/>
-              <a:defRPr sz="1488">
+            <a:lvl4pPr marL="1244816" indent="0">
+              <a:buNone/>
+              <a:defRPr sz="1305">
                 <a:solidFill>
                   <a:schemeClr val="tx1">
                     <a:tint val="75000"/>
@@ -1453,9 +1458,9 @@
                 </a:solidFill>
               </a:defRPr>
             </a:lvl4pPr>
-            <a:lvl5pPr marL="1892968" indent="0">
-              <a:buNone/>
-              <a:defRPr sz="1488">
+            <a:lvl5pPr marL="1659754" indent="0">
+              <a:buNone/>
+              <a:defRPr sz="1305">
                 <a:solidFill>
                   <a:schemeClr val="tx1">
                     <a:tint val="75000"/>
@@ -1463,9 +1468,9 @@
                 </a:solidFill>
               </a:defRPr>
             </a:lvl5pPr>
-            <a:lvl6pPr marL="2366210" indent="0">
-              <a:buNone/>
-              <a:defRPr sz="1488">
+            <a:lvl6pPr marL="2074693" indent="0">
+              <a:buNone/>
+              <a:defRPr sz="1305">
                 <a:solidFill>
                   <a:schemeClr val="tx1">
                     <a:tint val="75000"/>
@@ -1473,9 +1478,9 @@
                 </a:solidFill>
               </a:defRPr>
             </a:lvl6pPr>
-            <a:lvl7pPr marL="2839452" indent="0">
-              <a:buNone/>
-              <a:defRPr sz="1488">
+            <a:lvl7pPr marL="2489632" indent="0">
+              <a:buNone/>
+              <a:defRPr sz="1305">
                 <a:solidFill>
                   <a:schemeClr val="tx1">
                     <a:tint val="75000"/>
@@ -1483,9 +1488,9 @@
                 </a:solidFill>
               </a:defRPr>
             </a:lvl7pPr>
-            <a:lvl8pPr marL="3312694" indent="0">
-              <a:buNone/>
-              <a:defRPr sz="1488">
+            <a:lvl8pPr marL="2904570" indent="0">
+              <a:buNone/>
+              <a:defRPr sz="1305">
                 <a:solidFill>
                   <a:schemeClr val="tx1">
                     <a:tint val="75000"/>
@@ -1493,9 +1498,9 @@
                 </a:solidFill>
               </a:defRPr>
             </a:lvl8pPr>
-            <a:lvl9pPr marL="3785936" indent="0">
-              <a:buNone/>
-              <a:defRPr sz="1488">
+            <a:lvl9pPr marL="3319509" indent="0">
+              <a:buNone/>
+              <a:defRPr sz="1305">
                 <a:solidFill>
                   <a:schemeClr val="tx1">
                     <a:tint val="75000"/>
@@ -1530,7 +1535,7 @@
           <a:p>
             <a:fld id="{5E1DB631-D0B3-B145-A691-00AE099C1923}" type="datetimeFigureOut">
               <a:rPr lang="en-US" smtClean="0"/>
-              <a:t>8/5/19</a:t>
+              <a:t>8/19/19</a:t>
             </a:fld>
             <a:endParaRPr lang="en-US"/>
           </a:p>
@@ -1642,39 +1647,39 @@
         </p:nvSpPr>
         <p:spPr>
           <a:xfrm>
-            <a:off x="568325" y="827884"/>
-            <a:ext cx="5020204" cy="2341558"/>
+            <a:off x="498316" y="827884"/>
+            <a:ext cx="4401793" cy="2341558"/>
           </a:xfrm>
         </p:spPr>
         <p:txBody>
           <a:bodyPr/>
           <a:lstStyle>
             <a:lvl1pPr>
-              <a:defRPr sz="2869"/>
+              <a:defRPr sz="2516"/>
             </a:lvl1pPr>
             <a:lvl2pPr>
-              <a:defRPr sz="2444"/>
+              <a:defRPr sz="2143"/>
             </a:lvl2pPr>
             <a:lvl3pPr>
-              <a:defRPr sz="2019"/>
+              <a:defRPr sz="1770"/>
             </a:lvl3pPr>
             <a:lvl4pPr>
-              <a:defRPr sz="1913"/>
+              <a:defRPr sz="1677"/>
             </a:lvl4pPr>
             <a:lvl5pPr>
-              <a:defRPr sz="1913"/>
+              <a:defRPr sz="1677"/>
             </a:lvl5pPr>
             <a:lvl6pPr>
-              <a:defRPr sz="1913"/>
+              <a:defRPr sz="1677"/>
             </a:lvl6pPr>
             <a:lvl7pPr>
-              <a:defRPr sz="1913"/>
+              <a:defRPr sz="1677"/>
             </a:lvl7pPr>
             <a:lvl8pPr>
-              <a:defRPr sz="1913"/>
+              <a:defRPr sz="1677"/>
             </a:lvl8pPr>
             <a:lvl9pPr>
-              <a:defRPr sz="1913"/>
+              <a:defRPr sz="1677"/>
             </a:lvl9pPr>
           </a:lstStyle>
           <a:p>
@@ -1726,39 +1731,39 @@
         </p:nvSpPr>
         <p:spPr>
           <a:xfrm>
-            <a:off x="5777972" y="827884"/>
-            <a:ext cx="5020204" cy="2341558"/>
+            <a:off x="5066216" y="827884"/>
+            <a:ext cx="4401793" cy="2341558"/>
           </a:xfrm>
         </p:spPr>
         <p:txBody>
           <a:bodyPr/>
           <a:lstStyle>
             <a:lvl1pPr>
-              <a:defRPr sz="2869"/>
+              <a:defRPr sz="2516"/>
             </a:lvl1pPr>
             <a:lvl2pPr>
-              <a:defRPr sz="2444"/>
+              <a:defRPr sz="2143"/>
             </a:lvl2pPr>
             <a:lvl3pPr>
-              <a:defRPr sz="2019"/>
+              <a:defRPr sz="1770"/>
             </a:lvl3pPr>
             <a:lvl4pPr>
-              <a:defRPr sz="1913"/>
+              <a:defRPr sz="1677"/>
             </a:lvl4pPr>
             <a:lvl5pPr>
-              <a:defRPr sz="1913"/>
+              <a:defRPr sz="1677"/>
             </a:lvl5pPr>
             <a:lvl6pPr>
-              <a:defRPr sz="1913"/>
+              <a:defRPr sz="1677"/>
             </a:lvl6pPr>
             <a:lvl7pPr>
-              <a:defRPr sz="1913"/>
+              <a:defRPr sz="1677"/>
             </a:lvl7pPr>
             <a:lvl8pPr>
-              <a:defRPr sz="1913"/>
+              <a:defRPr sz="1677"/>
             </a:lvl8pPr>
             <a:lvl9pPr>
-              <a:defRPr sz="1913"/>
+              <a:defRPr sz="1677"/>
             </a:lvl9pPr>
           </a:lstStyle>
           <a:p>
@@ -1815,7 +1820,7 @@
           <a:p>
             <a:fld id="{5E1DB631-D0B3-B145-A691-00AE099C1923}" type="datetimeFigureOut">
               <a:rPr lang="en-US" smtClean="0"/>
-              <a:t>8/5/19</a:t>
+              <a:t>8/19/19</a:t>
             </a:fld>
             <a:endParaRPr lang="en-US"/>
           </a:p>
@@ -1931,8 +1936,8 @@
         </p:nvSpPr>
         <p:spPr>
           <a:xfrm>
-            <a:off x="568325" y="794209"/>
-            <a:ext cx="5022178" cy="330988"/>
+            <a:off x="498316" y="794209"/>
+            <a:ext cx="4403524" cy="330988"/>
           </a:xfrm>
         </p:spPr>
         <p:txBody>
@@ -1940,39 +1945,39 @@
           <a:lstStyle>
             <a:lvl1pPr marL="0" indent="0">
               <a:buNone/>
-              <a:defRPr sz="2444" b="1"/>
+              <a:defRPr sz="2143" b="1"/>
             </a:lvl1pPr>
-            <a:lvl2pPr marL="473242" indent="0">
-              <a:buNone/>
-              <a:defRPr sz="2019" b="1"/>
+            <a:lvl2pPr marL="414939" indent="0">
+              <a:buNone/>
+              <a:defRPr sz="1770" b="1"/>
             </a:lvl2pPr>
-            <a:lvl3pPr marL="946484" indent="0">
-              <a:buNone/>
-              <a:defRPr sz="1913" b="1"/>
+            <a:lvl3pPr marL="829877" indent="0">
+              <a:buNone/>
+              <a:defRPr sz="1677" b="1"/>
             </a:lvl3pPr>
-            <a:lvl4pPr marL="1419726" indent="0">
-              <a:buNone/>
-              <a:defRPr sz="1700" b="1"/>
+            <a:lvl4pPr marL="1244816" indent="0">
+              <a:buNone/>
+              <a:defRPr sz="1491" b="1"/>
             </a:lvl4pPr>
-            <a:lvl5pPr marL="1892968" indent="0">
-              <a:buNone/>
-              <a:defRPr sz="1700" b="1"/>
+            <a:lvl5pPr marL="1659754" indent="0">
+              <a:buNone/>
+              <a:defRPr sz="1491" b="1"/>
             </a:lvl5pPr>
-            <a:lvl6pPr marL="2366210" indent="0">
-              <a:buNone/>
-              <a:defRPr sz="1700" b="1"/>
+            <a:lvl6pPr marL="2074693" indent="0">
+              <a:buNone/>
+              <a:defRPr sz="1491" b="1"/>
             </a:lvl6pPr>
-            <a:lvl7pPr marL="2839452" indent="0">
-              <a:buNone/>
-              <a:defRPr sz="1700" b="1"/>
+            <a:lvl7pPr marL="2489632" indent="0">
+              <a:buNone/>
+              <a:defRPr sz="1491" b="1"/>
             </a:lvl7pPr>
-            <a:lvl8pPr marL="3312694" indent="0">
-              <a:buNone/>
-              <a:defRPr sz="1700" b="1"/>
+            <a:lvl8pPr marL="2904570" indent="0">
+              <a:buNone/>
+              <a:defRPr sz="1491" b="1"/>
             </a:lvl8pPr>
-            <a:lvl9pPr marL="3785936" indent="0">
-              <a:buNone/>
-              <a:defRPr sz="1700" b="1"/>
+            <a:lvl9pPr marL="3319509" indent="0">
+              <a:buNone/>
+              <a:defRPr sz="1491" b="1"/>
             </a:lvl9pPr>
           </a:lstStyle>
           <a:p>
@@ -1996,39 +2001,39 @@
         </p:nvSpPr>
         <p:spPr>
           <a:xfrm>
-            <a:off x="568325" y="1125195"/>
-            <a:ext cx="5022178" cy="2044243"/>
+            <a:off x="498316" y="1125196"/>
+            <a:ext cx="4403524" cy="2044243"/>
           </a:xfrm>
         </p:spPr>
         <p:txBody>
           <a:bodyPr/>
           <a:lstStyle>
             <a:lvl1pPr>
-              <a:defRPr sz="2444"/>
+              <a:defRPr sz="2143"/>
             </a:lvl1pPr>
             <a:lvl2pPr>
-              <a:defRPr sz="2019"/>
+              <a:defRPr sz="1770"/>
             </a:lvl2pPr>
             <a:lvl3pPr>
-              <a:defRPr sz="1913"/>
+              <a:defRPr sz="1677"/>
             </a:lvl3pPr>
             <a:lvl4pPr>
-              <a:defRPr sz="1700"/>
+              <a:defRPr sz="1491"/>
             </a:lvl4pPr>
             <a:lvl5pPr>
-              <a:defRPr sz="1700"/>
+              <a:defRPr sz="1491"/>
             </a:lvl5pPr>
             <a:lvl6pPr>
-              <a:defRPr sz="1700"/>
+              <a:defRPr sz="1491"/>
             </a:lvl6pPr>
             <a:lvl7pPr>
-              <a:defRPr sz="1700"/>
+              <a:defRPr sz="1491"/>
             </a:lvl7pPr>
             <a:lvl8pPr>
-              <a:defRPr sz="1700"/>
+              <a:defRPr sz="1491"/>
             </a:lvl8pPr>
             <a:lvl9pPr>
-              <a:defRPr sz="1700"/>
+              <a:defRPr sz="1491"/>
             </a:lvl9pPr>
           </a:lstStyle>
           <a:p>
@@ -2080,8 +2085,8 @@
         </p:nvSpPr>
         <p:spPr>
           <a:xfrm>
-            <a:off x="5774027" y="794209"/>
-            <a:ext cx="5024151" cy="330988"/>
+            <a:off x="5062758" y="794209"/>
+            <a:ext cx="4405254" cy="330988"/>
           </a:xfrm>
         </p:spPr>
         <p:txBody>
@@ -2089,39 +2094,39 @@
           <a:lstStyle>
             <a:lvl1pPr marL="0" indent="0">
               <a:buNone/>
-              <a:defRPr sz="2444" b="1"/>
+              <a:defRPr sz="2143" b="1"/>
             </a:lvl1pPr>
-            <a:lvl2pPr marL="473242" indent="0">
-              <a:buNone/>
-              <a:defRPr sz="2019" b="1"/>
+            <a:lvl2pPr marL="414939" indent="0">
+              <a:buNone/>
+              <a:defRPr sz="1770" b="1"/>
             </a:lvl2pPr>
-            <a:lvl3pPr marL="946484" indent="0">
-              <a:buNone/>
-              <a:defRPr sz="1913" b="1"/>
+            <a:lvl3pPr marL="829877" indent="0">
+              <a:buNone/>
+              <a:defRPr sz="1677" b="1"/>
             </a:lvl3pPr>
-            <a:lvl4pPr marL="1419726" indent="0">
-              <a:buNone/>
-              <a:defRPr sz="1700" b="1"/>
+            <a:lvl4pPr marL="1244816" indent="0">
+              <a:buNone/>
+              <a:defRPr sz="1491" b="1"/>
             </a:lvl4pPr>
-            <a:lvl5pPr marL="1892968" indent="0">
-              <a:buNone/>
-              <a:defRPr sz="1700" b="1"/>
+            <a:lvl5pPr marL="1659754" indent="0">
+              <a:buNone/>
+              <a:defRPr sz="1491" b="1"/>
             </a:lvl5pPr>
-            <a:lvl6pPr marL="2366210" indent="0">
-              <a:buNone/>
-              <a:defRPr sz="1700" b="1"/>
+            <a:lvl6pPr marL="2074693" indent="0">
+              <a:buNone/>
+              <a:defRPr sz="1491" b="1"/>
             </a:lvl6pPr>
-            <a:lvl7pPr marL="2839452" indent="0">
-              <a:buNone/>
-              <a:defRPr sz="1700" b="1"/>
+            <a:lvl7pPr marL="2489632" indent="0">
+              <a:buNone/>
+              <a:defRPr sz="1491" b="1"/>
             </a:lvl7pPr>
-            <a:lvl8pPr marL="3312694" indent="0">
-              <a:buNone/>
-              <a:defRPr sz="1700" b="1"/>
+            <a:lvl8pPr marL="2904570" indent="0">
+              <a:buNone/>
+              <a:defRPr sz="1491" b="1"/>
             </a:lvl8pPr>
-            <a:lvl9pPr marL="3785936" indent="0">
-              <a:buNone/>
-              <a:defRPr sz="1700" b="1"/>
+            <a:lvl9pPr marL="3319509" indent="0">
+              <a:buNone/>
+              <a:defRPr sz="1491" b="1"/>
             </a:lvl9pPr>
           </a:lstStyle>
           <a:p>
@@ -2145,39 +2150,39 @@
         </p:nvSpPr>
         <p:spPr>
           <a:xfrm>
-            <a:off x="5774027" y="1125195"/>
-            <a:ext cx="5024151" cy="2044243"/>
+            <a:off x="5062758" y="1125196"/>
+            <a:ext cx="4405254" cy="2044243"/>
           </a:xfrm>
         </p:spPr>
         <p:txBody>
           <a:bodyPr/>
           <a:lstStyle>
             <a:lvl1pPr>
-              <a:defRPr sz="2444"/>
+              <a:defRPr sz="2143"/>
             </a:lvl1pPr>
             <a:lvl2pPr>
-              <a:defRPr sz="2019"/>
+              <a:defRPr sz="1770"/>
             </a:lvl2pPr>
             <a:lvl3pPr>
-              <a:defRPr sz="1913"/>
+              <a:defRPr sz="1677"/>
             </a:lvl3pPr>
             <a:lvl4pPr>
-              <a:defRPr sz="1700"/>
+              <a:defRPr sz="1491"/>
             </a:lvl4pPr>
             <a:lvl5pPr>
-              <a:defRPr sz="1700"/>
+              <a:defRPr sz="1491"/>
             </a:lvl5pPr>
             <a:lvl6pPr>
-              <a:defRPr sz="1700"/>
+              <a:defRPr sz="1491"/>
             </a:lvl6pPr>
             <a:lvl7pPr>
-              <a:defRPr sz="1700"/>
+              <a:defRPr sz="1491"/>
             </a:lvl7pPr>
             <a:lvl8pPr>
-              <a:defRPr sz="1700"/>
+              <a:defRPr sz="1491"/>
             </a:lvl8pPr>
             <a:lvl9pPr>
-              <a:defRPr sz="1700"/>
+              <a:defRPr sz="1491"/>
             </a:lvl9pPr>
           </a:lstStyle>
           <a:p>
@@ -2234,7 +2239,7 @@
           <a:p>
             <a:fld id="{5E1DB631-D0B3-B145-A691-00AE099C1923}" type="datetimeFigureOut">
               <a:rPr lang="en-US" smtClean="0"/>
-              <a:t>8/5/19</a:t>
+              <a:t>8/19/19</a:t>
             </a:fld>
             <a:endParaRPr lang="en-US"/>
           </a:p>
@@ -2351,7 +2356,7 @@
           <a:p>
             <a:fld id="{5E1DB631-D0B3-B145-A691-00AE099C1923}" type="datetimeFigureOut">
               <a:rPr lang="en-US" smtClean="0"/>
-              <a:t>8/5/19</a:t>
+              <a:t>8/19/19</a:t>
             </a:fld>
             <a:endParaRPr lang="en-US"/>
           </a:p>
@@ -2446,7 +2451,7 @@
           <a:p>
             <a:fld id="{5E1DB631-D0B3-B145-A691-00AE099C1923}" type="datetimeFigureOut">
               <a:rPr lang="en-US" smtClean="0"/>
-              <a:t>8/5/19</a:t>
+              <a:t>8/19/19</a:t>
             </a:fld>
             <a:endParaRPr lang="en-US"/>
           </a:p>
@@ -2536,15 +2541,15 @@
         </p:nvSpPr>
         <p:spPr>
           <a:xfrm>
-            <a:off x="568326" y="141265"/>
-            <a:ext cx="3739500" cy="601200"/>
+            <a:off x="498317" y="141265"/>
+            <a:ext cx="3278852" cy="601200"/>
           </a:xfrm>
         </p:spPr>
         <p:txBody>
           <a:bodyPr anchor="b"/>
           <a:lstStyle>
             <a:lvl1pPr algn="l">
-              <a:defRPr sz="2019" b="1"/>
+              <a:defRPr sz="1770" b="1"/>
             </a:lvl1pPr>
           </a:lstStyle>
           <a:p>
@@ -2567,39 +2572,39 @@
         </p:nvSpPr>
         <p:spPr>
           <a:xfrm>
-            <a:off x="4443986" y="141267"/>
-            <a:ext cx="6354189" cy="3028174"/>
+            <a:off x="3896557" y="141267"/>
+            <a:ext cx="5571452" cy="3028174"/>
           </a:xfrm>
         </p:spPr>
         <p:txBody>
           <a:bodyPr/>
           <a:lstStyle>
             <a:lvl1pPr>
-              <a:defRPr sz="3294"/>
+              <a:defRPr sz="2888"/>
             </a:lvl1pPr>
             <a:lvl2pPr>
-              <a:defRPr sz="2869"/>
+              <a:defRPr sz="2516"/>
             </a:lvl2pPr>
             <a:lvl3pPr>
-              <a:defRPr sz="2444"/>
+              <a:defRPr sz="2143"/>
             </a:lvl3pPr>
             <a:lvl4pPr>
-              <a:defRPr sz="2019"/>
+              <a:defRPr sz="1770"/>
             </a:lvl4pPr>
             <a:lvl5pPr>
-              <a:defRPr sz="2019"/>
+              <a:defRPr sz="1770"/>
             </a:lvl5pPr>
             <a:lvl6pPr>
-              <a:defRPr sz="2019"/>
+              <a:defRPr sz="1770"/>
             </a:lvl6pPr>
             <a:lvl7pPr>
-              <a:defRPr sz="2019"/>
+              <a:defRPr sz="1770"/>
             </a:lvl7pPr>
             <a:lvl8pPr>
-              <a:defRPr sz="2019"/>
+              <a:defRPr sz="1770"/>
             </a:lvl8pPr>
             <a:lvl9pPr>
-              <a:defRPr sz="2019"/>
+              <a:defRPr sz="1770"/>
             </a:lvl9pPr>
           </a:lstStyle>
           <a:p>
@@ -2651,8 +2656,8 @@
         </p:nvSpPr>
         <p:spPr>
           <a:xfrm>
-            <a:off x="568326" y="742468"/>
-            <a:ext cx="3739500" cy="2426974"/>
+            <a:off x="498317" y="742468"/>
+            <a:ext cx="3278852" cy="2426974"/>
           </a:xfrm>
         </p:spPr>
         <p:txBody>
@@ -2660,39 +2665,39 @@
           <a:lstStyle>
             <a:lvl1pPr marL="0" indent="0">
               <a:buNone/>
-              <a:defRPr sz="1488"/>
+              <a:defRPr sz="1305"/>
             </a:lvl1pPr>
-            <a:lvl2pPr marL="473242" indent="0">
-              <a:buNone/>
-              <a:defRPr sz="1275"/>
+            <a:lvl2pPr marL="414939" indent="0">
+              <a:buNone/>
+              <a:defRPr sz="1118"/>
             </a:lvl2pPr>
-            <a:lvl3pPr marL="946484" indent="0">
-              <a:buNone/>
-              <a:defRPr sz="1063"/>
+            <a:lvl3pPr marL="829877" indent="0">
+              <a:buNone/>
+              <a:defRPr sz="932"/>
             </a:lvl3pPr>
-            <a:lvl4pPr marL="1419726" indent="0">
-              <a:buNone/>
-              <a:defRPr sz="956"/>
+            <a:lvl4pPr marL="1244816" indent="0">
+              <a:buNone/>
+              <a:defRPr sz="838"/>
             </a:lvl4pPr>
-            <a:lvl5pPr marL="1892968" indent="0">
-              <a:buNone/>
-              <a:defRPr sz="956"/>
+            <a:lvl5pPr marL="1659754" indent="0">
+              <a:buNone/>
+              <a:defRPr sz="838"/>
             </a:lvl5pPr>
-            <a:lvl6pPr marL="2366210" indent="0">
-              <a:buNone/>
-              <a:defRPr sz="956"/>
+            <a:lvl6pPr marL="2074693" indent="0">
+              <a:buNone/>
+              <a:defRPr sz="838"/>
             </a:lvl6pPr>
-            <a:lvl7pPr marL="2839452" indent="0">
-              <a:buNone/>
-              <a:defRPr sz="956"/>
+            <a:lvl7pPr marL="2489632" indent="0">
+              <a:buNone/>
+              <a:defRPr sz="838"/>
             </a:lvl7pPr>
-            <a:lvl8pPr marL="3312694" indent="0">
-              <a:buNone/>
-              <a:defRPr sz="956"/>
+            <a:lvl8pPr marL="2904570" indent="0">
+              <a:buNone/>
+              <a:defRPr sz="838"/>
             </a:lvl8pPr>
-            <a:lvl9pPr marL="3785936" indent="0">
-              <a:buNone/>
-              <a:defRPr sz="956"/>
+            <a:lvl9pPr marL="3319509" indent="0">
+              <a:buNone/>
+              <a:defRPr sz="838"/>
             </a:lvl9pPr>
           </a:lstStyle>
           <a:p>
@@ -2721,7 +2726,7 @@
           <a:p>
             <a:fld id="{5E1DB631-D0B3-B145-A691-00AE099C1923}" type="datetimeFigureOut">
               <a:rPr lang="en-US" smtClean="0"/>
-              <a:t>8/5/19</a:t>
+              <a:t>8/19/19</a:t>
             </a:fld>
             <a:endParaRPr lang="en-US"/>
           </a:p>
@@ -2811,15 +2816,15 @@
         </p:nvSpPr>
         <p:spPr>
           <a:xfrm>
-            <a:off x="2227914" y="2483646"/>
-            <a:ext cx="6819900" cy="293209"/>
+            <a:off x="1953470" y="2483647"/>
+            <a:ext cx="5979795" cy="293209"/>
           </a:xfrm>
         </p:spPr>
         <p:txBody>
           <a:bodyPr anchor="b"/>
           <a:lstStyle>
             <a:lvl1pPr algn="l">
-              <a:defRPr sz="2019" b="1"/>
+              <a:defRPr sz="1770" b="1"/>
             </a:lvl1pPr>
           </a:lstStyle>
           <a:p>
@@ -2842,8 +2847,8 @@
         </p:nvSpPr>
         <p:spPr>
           <a:xfrm>
-            <a:off x="2227914" y="317028"/>
-            <a:ext cx="6819900" cy="2128838"/>
+            <a:off x="1953470" y="317028"/>
+            <a:ext cx="5979795" cy="2128838"/>
           </a:xfrm>
         </p:spPr>
         <p:txBody>
@@ -2851,39 +2856,39 @@
           <a:lstStyle>
             <a:lvl1pPr marL="0" indent="0">
               <a:buNone/>
-              <a:defRPr sz="3294"/>
+              <a:defRPr sz="2888"/>
             </a:lvl1pPr>
-            <a:lvl2pPr marL="473242" indent="0">
-              <a:buNone/>
-              <a:defRPr sz="2869"/>
+            <a:lvl2pPr marL="414939" indent="0">
+              <a:buNone/>
+              <a:defRPr sz="2516"/>
             </a:lvl2pPr>
-            <a:lvl3pPr marL="946484" indent="0">
-              <a:buNone/>
-              <a:defRPr sz="2444"/>
+            <a:lvl3pPr marL="829877" indent="0">
+              <a:buNone/>
+              <a:defRPr sz="2143"/>
             </a:lvl3pPr>
-            <a:lvl4pPr marL="1419726" indent="0">
-              <a:buNone/>
-              <a:defRPr sz="2019"/>
+            <a:lvl4pPr marL="1244816" indent="0">
+              <a:buNone/>
+              <a:defRPr sz="1770"/>
             </a:lvl4pPr>
-            <a:lvl5pPr marL="1892968" indent="0">
-              <a:buNone/>
-              <a:defRPr sz="2019"/>
+            <a:lvl5pPr marL="1659754" indent="0">
+              <a:buNone/>
+              <a:defRPr sz="1770"/>
             </a:lvl5pPr>
-            <a:lvl6pPr marL="2366210" indent="0">
-              <a:buNone/>
-              <a:defRPr sz="2019"/>
+            <a:lvl6pPr marL="2074693" indent="0">
+              <a:buNone/>
+              <a:defRPr sz="1770"/>
             </a:lvl6pPr>
-            <a:lvl7pPr marL="2839452" indent="0">
-              <a:buNone/>
-              <a:defRPr sz="2019"/>
+            <a:lvl7pPr marL="2489632" indent="0">
+              <a:buNone/>
+              <a:defRPr sz="1770"/>
             </a:lvl7pPr>
-            <a:lvl8pPr marL="3312694" indent="0">
-              <a:buNone/>
-              <a:defRPr sz="2019"/>
+            <a:lvl8pPr marL="2904570" indent="0">
+              <a:buNone/>
+              <a:defRPr sz="1770"/>
             </a:lvl8pPr>
-            <a:lvl9pPr marL="3785936" indent="0">
-              <a:buNone/>
-              <a:defRPr sz="2019"/>
+            <a:lvl9pPr marL="3319509" indent="0">
+              <a:buNone/>
+              <a:defRPr sz="1770"/>
             </a:lvl9pPr>
           </a:lstStyle>
           <a:p>
@@ -2906,8 +2911,8 @@
         </p:nvSpPr>
         <p:spPr>
           <a:xfrm>
-            <a:off x="2227914" y="2776853"/>
-            <a:ext cx="6819900" cy="416404"/>
+            <a:off x="1953470" y="2776853"/>
+            <a:ext cx="5979795" cy="416404"/>
           </a:xfrm>
         </p:spPr>
         <p:txBody>
@@ -2915,39 +2920,39 @@
           <a:lstStyle>
             <a:lvl1pPr marL="0" indent="0">
               <a:buNone/>
-              <a:defRPr sz="1488"/>
+              <a:defRPr sz="1305"/>
             </a:lvl1pPr>
-            <a:lvl2pPr marL="473242" indent="0">
-              <a:buNone/>
-              <a:defRPr sz="1275"/>
+            <a:lvl2pPr marL="414939" indent="0">
+              <a:buNone/>
+              <a:defRPr sz="1118"/>
             </a:lvl2pPr>
-            <a:lvl3pPr marL="946484" indent="0">
-              <a:buNone/>
-              <a:defRPr sz="1063"/>
+            <a:lvl3pPr marL="829877" indent="0">
+              <a:buNone/>
+              <a:defRPr sz="932"/>
             </a:lvl3pPr>
-            <a:lvl4pPr marL="1419726" indent="0">
-              <a:buNone/>
-              <a:defRPr sz="956"/>
+            <a:lvl4pPr marL="1244816" indent="0">
+              <a:buNone/>
+              <a:defRPr sz="838"/>
             </a:lvl4pPr>
-            <a:lvl5pPr marL="1892968" indent="0">
-              <a:buNone/>
-              <a:defRPr sz="956"/>
+            <a:lvl5pPr marL="1659754" indent="0">
+              <a:buNone/>
+              <a:defRPr sz="838"/>
             </a:lvl5pPr>
-            <a:lvl6pPr marL="2366210" indent="0">
-              <a:buNone/>
-              <a:defRPr sz="956"/>
+            <a:lvl6pPr marL="2074693" indent="0">
+              <a:buNone/>
+              <a:defRPr sz="838"/>
             </a:lvl6pPr>
-            <a:lvl7pPr marL="2839452" indent="0">
-              <a:buNone/>
-              <a:defRPr sz="956"/>
+            <a:lvl7pPr marL="2489632" indent="0">
+              <a:buNone/>
+              <a:defRPr sz="838"/>
             </a:lvl7pPr>
-            <a:lvl8pPr marL="3312694" indent="0">
-              <a:buNone/>
-              <a:defRPr sz="956"/>
+            <a:lvl8pPr marL="2904570" indent="0">
+              <a:buNone/>
+              <a:defRPr sz="838"/>
             </a:lvl8pPr>
-            <a:lvl9pPr marL="3785936" indent="0">
-              <a:buNone/>
-              <a:defRPr sz="956"/>
+            <a:lvl9pPr marL="3319509" indent="0">
+              <a:buNone/>
+              <a:defRPr sz="838"/>
             </a:lvl9pPr>
           </a:lstStyle>
           <a:p>
@@ -2976,7 +2981,7 @@
           <a:p>
             <a:fld id="{5E1DB631-D0B3-B145-A691-00AE099C1923}" type="datetimeFigureOut">
               <a:rPr lang="en-US" smtClean="0"/>
-              <a:t>8/5/19</a:t>
+              <a:t>8/19/19</a:t>
             </a:fld>
             <a:endParaRPr lang="en-US"/>
           </a:p>
@@ -3071,8 +3076,8 @@
         </p:nvSpPr>
         <p:spPr>
           <a:xfrm>
-            <a:off x="568325" y="142088"/>
-            <a:ext cx="10229851" cy="591344"/>
+            <a:off x="498317" y="142088"/>
+            <a:ext cx="8969693" cy="591344"/>
           </a:xfrm>
           <a:prstGeom prst="rect">
             <a:avLst/>
@@ -3103,8 +3108,8 @@
         </p:nvSpPr>
         <p:spPr>
           <a:xfrm>
-            <a:off x="568325" y="827884"/>
-            <a:ext cx="10229851" cy="2341558"/>
+            <a:off x="498317" y="827884"/>
+            <a:ext cx="8969693" cy="2341558"/>
           </a:xfrm>
           <a:prstGeom prst="rect">
             <a:avLst/>
@@ -3164,8 +3169,8 @@
         </p:nvSpPr>
         <p:spPr>
           <a:xfrm>
-            <a:off x="568325" y="3288529"/>
-            <a:ext cx="2652183" cy="188902"/>
+            <a:off x="498316" y="3288529"/>
+            <a:ext cx="2325476" cy="188902"/>
           </a:xfrm>
           <a:prstGeom prst="rect">
             <a:avLst/>
@@ -3175,7 +3180,7 @@
           <a:bodyPr vert="horz" lIns="89081" tIns="44540" rIns="89081" bIns="44540" rtlCol="0" anchor="ctr"/>
           <a:lstStyle>
             <a:lvl1pPr algn="l">
-              <a:defRPr sz="1275">
+              <a:defRPr sz="1118">
                 <a:solidFill>
                   <a:schemeClr val="tx1">
                     <a:tint val="75000"/>
@@ -3187,7 +3192,7 @@
           <a:p>
             <a:fld id="{5E1DB631-D0B3-B145-A691-00AE099C1923}" type="datetimeFigureOut">
               <a:rPr lang="en-US" smtClean="0"/>
-              <a:t>8/5/19</a:t>
+              <a:t>8/19/19</a:t>
             </a:fld>
             <a:endParaRPr lang="en-US"/>
           </a:p>
@@ -3205,8 +3210,8 @@
         </p:nvSpPr>
         <p:spPr>
           <a:xfrm>
-            <a:off x="3883555" y="3288529"/>
-            <a:ext cx="3599392" cy="188902"/>
+            <a:off x="3405162" y="3288529"/>
+            <a:ext cx="3156003" cy="188902"/>
           </a:xfrm>
           <a:prstGeom prst="rect">
             <a:avLst/>
@@ -3216,7 +3221,7 @@
           <a:bodyPr vert="horz" lIns="89081" tIns="44540" rIns="89081" bIns="44540" rtlCol="0" anchor="ctr"/>
           <a:lstStyle>
             <a:lvl1pPr algn="ctr">
-              <a:defRPr sz="1275">
+              <a:defRPr sz="1118">
                 <a:solidFill>
                   <a:schemeClr val="tx1">
                     <a:tint val="75000"/>
@@ -3242,8 +3247,8 @@
         </p:nvSpPr>
         <p:spPr>
           <a:xfrm>
-            <a:off x="8145992" y="3288529"/>
-            <a:ext cx="2652183" cy="188902"/>
+            <a:off x="7142533" y="3288529"/>
+            <a:ext cx="2325476" cy="188902"/>
           </a:xfrm>
           <a:prstGeom prst="rect">
             <a:avLst/>
@@ -3253,7 +3258,7 @@
           <a:bodyPr vert="horz" lIns="89081" tIns="44540" rIns="89081" bIns="44540" rtlCol="0" anchor="ctr"/>
           <a:lstStyle>
             <a:lvl1pPr algn="r">
-              <a:defRPr sz="1275">
+              <a:defRPr sz="1118">
                 <a:solidFill>
                   <a:schemeClr val="tx1">
                     <a:tint val="75000"/>
@@ -3294,12 +3299,12 @@
   </p:sldLayoutIdLst>
   <p:txStyles>
     <p:titleStyle>
-      <a:lvl1pPr algn="ctr" defTabSz="946484" rtl="0" eaLnBrk="1" latinLnBrk="0" hangingPunct="1">
+      <a:lvl1pPr algn="ctr" defTabSz="829877" rtl="0" eaLnBrk="1" latinLnBrk="0" hangingPunct="1">
         <a:spcBef>
           <a:spcPct val="0"/>
         </a:spcBef>
         <a:buNone/>
-        <a:defRPr sz="4569" kern="1200">
+        <a:defRPr sz="4006" kern="1200">
           <a:solidFill>
             <a:schemeClr val="tx1"/>
           </a:solidFill>
@@ -3310,13 +3315,13 @@
       </a:lvl1pPr>
     </p:titleStyle>
     <p:bodyStyle>
-      <a:lvl1pPr marL="354931" indent="-354931" algn="l" defTabSz="946484" rtl="0" eaLnBrk="1" latinLnBrk="0" hangingPunct="1">
+      <a:lvl1pPr marL="311204" indent="-311204" algn="l" defTabSz="829877" rtl="0" eaLnBrk="1" latinLnBrk="0" hangingPunct="1">
         <a:spcBef>
           <a:spcPct val="20000"/>
         </a:spcBef>
         <a:buFont typeface="Arial" pitchFamily="34" charset="0"/>
         <a:buChar char="•"/>
-        <a:defRPr sz="3294" kern="1200">
+        <a:defRPr sz="2888" kern="1200">
           <a:solidFill>
             <a:schemeClr val="tx1"/>
           </a:solidFill>
@@ -3325,13 +3330,13 @@
           <a:cs typeface="+mn-cs"/>
         </a:defRPr>
       </a:lvl1pPr>
-      <a:lvl2pPr marL="769018" indent="-295777" algn="l" defTabSz="946484" rtl="0" eaLnBrk="1" latinLnBrk="0" hangingPunct="1">
+      <a:lvl2pPr marL="674275" indent="-259337" algn="l" defTabSz="829877" rtl="0" eaLnBrk="1" latinLnBrk="0" hangingPunct="1">
         <a:spcBef>
           <a:spcPct val="20000"/>
         </a:spcBef>
         <a:buFont typeface="Arial" pitchFamily="34" charset="0"/>
         <a:buChar char="–"/>
-        <a:defRPr sz="2869" kern="1200">
+        <a:defRPr sz="2516" kern="1200">
           <a:solidFill>
             <a:schemeClr val="tx1"/>
           </a:solidFill>
@@ -3340,13 +3345,13 @@
           <a:cs typeface="+mn-cs"/>
         </a:defRPr>
       </a:lvl2pPr>
-      <a:lvl3pPr marL="1183105" indent="-236621" algn="l" defTabSz="946484" rtl="0" eaLnBrk="1" latinLnBrk="0" hangingPunct="1">
+      <a:lvl3pPr marL="1037346" indent="-207469" algn="l" defTabSz="829877" rtl="0" eaLnBrk="1" latinLnBrk="0" hangingPunct="1">
         <a:spcBef>
           <a:spcPct val="20000"/>
         </a:spcBef>
         <a:buFont typeface="Arial" pitchFamily="34" charset="0"/>
         <a:buChar char="•"/>
-        <a:defRPr sz="2444" kern="1200">
+        <a:defRPr sz="2143" kern="1200">
           <a:solidFill>
             <a:schemeClr val="tx1"/>
           </a:solidFill>
@@ -3355,13 +3360,13 @@
           <a:cs typeface="+mn-cs"/>
         </a:defRPr>
       </a:lvl3pPr>
-      <a:lvl4pPr marL="1656347" indent="-236621" algn="l" defTabSz="946484" rtl="0" eaLnBrk="1" latinLnBrk="0" hangingPunct="1">
+      <a:lvl4pPr marL="1452285" indent="-207469" algn="l" defTabSz="829877" rtl="0" eaLnBrk="1" latinLnBrk="0" hangingPunct="1">
         <a:spcBef>
           <a:spcPct val="20000"/>
         </a:spcBef>
         <a:buFont typeface="Arial" pitchFamily="34" charset="0"/>
         <a:buChar char="–"/>
-        <a:defRPr sz="2019" kern="1200">
+        <a:defRPr sz="1770" kern="1200">
           <a:solidFill>
             <a:schemeClr val="tx1"/>
           </a:solidFill>
@@ -3370,13 +3375,13 @@
           <a:cs typeface="+mn-cs"/>
         </a:defRPr>
       </a:lvl4pPr>
-      <a:lvl5pPr marL="2129589" indent="-236621" algn="l" defTabSz="946484" rtl="0" eaLnBrk="1" latinLnBrk="0" hangingPunct="1">
+      <a:lvl5pPr marL="1867224" indent="-207469" algn="l" defTabSz="829877" rtl="0" eaLnBrk="1" latinLnBrk="0" hangingPunct="1">
         <a:spcBef>
           <a:spcPct val="20000"/>
         </a:spcBef>
         <a:buFont typeface="Arial" pitchFamily="34" charset="0"/>
         <a:buChar char="»"/>
-        <a:defRPr sz="2019" kern="1200">
+        <a:defRPr sz="1770" kern="1200">
           <a:solidFill>
             <a:schemeClr val="tx1"/>
           </a:solidFill>
@@ -3385,13 +3390,13 @@
           <a:cs typeface="+mn-cs"/>
         </a:defRPr>
       </a:lvl5pPr>
-      <a:lvl6pPr marL="2602831" indent="-236621" algn="l" defTabSz="946484" rtl="0" eaLnBrk="1" latinLnBrk="0" hangingPunct="1">
+      <a:lvl6pPr marL="2282162" indent="-207469" algn="l" defTabSz="829877" rtl="0" eaLnBrk="1" latinLnBrk="0" hangingPunct="1">
         <a:spcBef>
           <a:spcPct val="20000"/>
         </a:spcBef>
         <a:buFont typeface="Arial" pitchFamily="34" charset="0"/>
         <a:buChar char="•"/>
-        <a:defRPr sz="2019" kern="1200">
+        <a:defRPr sz="1770" kern="1200">
           <a:solidFill>
             <a:schemeClr val="tx1"/>
           </a:solidFill>
@@ -3400,13 +3405,13 @@
           <a:cs typeface="+mn-cs"/>
         </a:defRPr>
       </a:lvl6pPr>
-      <a:lvl7pPr marL="3076074" indent="-236621" algn="l" defTabSz="946484" rtl="0" eaLnBrk="1" latinLnBrk="0" hangingPunct="1">
+      <a:lvl7pPr marL="2697102" indent="-207469" algn="l" defTabSz="829877" rtl="0" eaLnBrk="1" latinLnBrk="0" hangingPunct="1">
         <a:spcBef>
           <a:spcPct val="20000"/>
         </a:spcBef>
         <a:buFont typeface="Arial" pitchFamily="34" charset="0"/>
         <a:buChar char="•"/>
-        <a:defRPr sz="2019" kern="1200">
+        <a:defRPr sz="1770" kern="1200">
           <a:solidFill>
             <a:schemeClr val="tx1"/>
           </a:solidFill>
@@ -3415,13 +3420,13 @@
           <a:cs typeface="+mn-cs"/>
         </a:defRPr>
       </a:lvl7pPr>
-      <a:lvl8pPr marL="3549315" indent="-236621" algn="l" defTabSz="946484" rtl="0" eaLnBrk="1" latinLnBrk="0" hangingPunct="1">
+      <a:lvl8pPr marL="3112039" indent="-207469" algn="l" defTabSz="829877" rtl="0" eaLnBrk="1" latinLnBrk="0" hangingPunct="1">
         <a:spcBef>
           <a:spcPct val="20000"/>
         </a:spcBef>
         <a:buFont typeface="Arial" pitchFamily="34" charset="0"/>
         <a:buChar char="•"/>
-        <a:defRPr sz="2019" kern="1200">
+        <a:defRPr sz="1770" kern="1200">
           <a:solidFill>
             <a:schemeClr val="tx1"/>
           </a:solidFill>
@@ -3430,13 +3435,13 @@
           <a:cs typeface="+mn-cs"/>
         </a:defRPr>
       </a:lvl8pPr>
-      <a:lvl9pPr marL="4022557" indent="-236621" algn="l" defTabSz="946484" rtl="0" eaLnBrk="1" latinLnBrk="0" hangingPunct="1">
+      <a:lvl9pPr marL="3526978" indent="-207469" algn="l" defTabSz="829877" rtl="0" eaLnBrk="1" latinLnBrk="0" hangingPunct="1">
         <a:spcBef>
           <a:spcPct val="20000"/>
         </a:spcBef>
         <a:buFont typeface="Arial" pitchFamily="34" charset="0"/>
         <a:buChar char="•"/>
-        <a:defRPr sz="2019" kern="1200">
+        <a:defRPr sz="1770" kern="1200">
           <a:solidFill>
             <a:schemeClr val="tx1"/>
           </a:solidFill>
@@ -3450,8 +3455,8 @@
       <a:defPPr>
         <a:defRPr lang="en-US"/>
       </a:defPPr>
-      <a:lvl1pPr marL="0" algn="l" defTabSz="946484" rtl="0" eaLnBrk="1" latinLnBrk="0" hangingPunct="1">
-        <a:defRPr sz="1913" kern="1200">
+      <a:lvl1pPr marL="0" algn="l" defTabSz="829877" rtl="0" eaLnBrk="1" latinLnBrk="0" hangingPunct="1">
+        <a:defRPr sz="1677" kern="1200">
           <a:solidFill>
             <a:schemeClr val="tx1"/>
           </a:solidFill>
@@ -3460,8 +3465,8 @@
           <a:cs typeface="+mn-cs"/>
         </a:defRPr>
       </a:lvl1pPr>
-      <a:lvl2pPr marL="473242" algn="l" defTabSz="946484" rtl="0" eaLnBrk="1" latinLnBrk="0" hangingPunct="1">
-        <a:defRPr sz="1913" kern="1200">
+      <a:lvl2pPr marL="414939" algn="l" defTabSz="829877" rtl="0" eaLnBrk="1" latinLnBrk="0" hangingPunct="1">
+        <a:defRPr sz="1677" kern="1200">
           <a:solidFill>
             <a:schemeClr val="tx1"/>
           </a:solidFill>
@@ -3470,8 +3475,8 @@
           <a:cs typeface="+mn-cs"/>
         </a:defRPr>
       </a:lvl2pPr>
-      <a:lvl3pPr marL="946484" algn="l" defTabSz="946484" rtl="0" eaLnBrk="1" latinLnBrk="0" hangingPunct="1">
-        <a:defRPr sz="1913" kern="1200">
+      <a:lvl3pPr marL="829877" algn="l" defTabSz="829877" rtl="0" eaLnBrk="1" latinLnBrk="0" hangingPunct="1">
+        <a:defRPr sz="1677" kern="1200">
           <a:solidFill>
             <a:schemeClr val="tx1"/>
           </a:solidFill>
@@ -3480,8 +3485,8 @@
           <a:cs typeface="+mn-cs"/>
         </a:defRPr>
       </a:lvl3pPr>
-      <a:lvl4pPr marL="1419726" algn="l" defTabSz="946484" rtl="0" eaLnBrk="1" latinLnBrk="0" hangingPunct="1">
-        <a:defRPr sz="1913" kern="1200">
+      <a:lvl4pPr marL="1244816" algn="l" defTabSz="829877" rtl="0" eaLnBrk="1" latinLnBrk="0" hangingPunct="1">
+        <a:defRPr sz="1677" kern="1200">
           <a:solidFill>
             <a:schemeClr val="tx1"/>
           </a:solidFill>
@@ -3490,8 +3495,8 @@
           <a:cs typeface="+mn-cs"/>
         </a:defRPr>
       </a:lvl4pPr>
-      <a:lvl5pPr marL="1892968" algn="l" defTabSz="946484" rtl="0" eaLnBrk="1" latinLnBrk="0" hangingPunct="1">
-        <a:defRPr sz="1913" kern="1200">
+      <a:lvl5pPr marL="1659754" algn="l" defTabSz="829877" rtl="0" eaLnBrk="1" latinLnBrk="0" hangingPunct="1">
+        <a:defRPr sz="1677" kern="1200">
           <a:solidFill>
             <a:schemeClr val="tx1"/>
           </a:solidFill>
@@ -3500,8 +3505,8 @@
           <a:cs typeface="+mn-cs"/>
         </a:defRPr>
       </a:lvl5pPr>
-      <a:lvl6pPr marL="2366210" algn="l" defTabSz="946484" rtl="0" eaLnBrk="1" latinLnBrk="0" hangingPunct="1">
-        <a:defRPr sz="1913" kern="1200">
+      <a:lvl6pPr marL="2074693" algn="l" defTabSz="829877" rtl="0" eaLnBrk="1" latinLnBrk="0" hangingPunct="1">
+        <a:defRPr sz="1677" kern="1200">
           <a:solidFill>
             <a:schemeClr val="tx1"/>
           </a:solidFill>
@@ -3510,8 +3515,8 @@
           <a:cs typeface="+mn-cs"/>
         </a:defRPr>
       </a:lvl6pPr>
-      <a:lvl7pPr marL="2839452" algn="l" defTabSz="946484" rtl="0" eaLnBrk="1" latinLnBrk="0" hangingPunct="1">
-        <a:defRPr sz="1913" kern="1200">
+      <a:lvl7pPr marL="2489632" algn="l" defTabSz="829877" rtl="0" eaLnBrk="1" latinLnBrk="0" hangingPunct="1">
+        <a:defRPr sz="1677" kern="1200">
           <a:solidFill>
             <a:schemeClr val="tx1"/>
           </a:solidFill>
@@ -3520,8 +3525,8 @@
           <a:cs typeface="+mn-cs"/>
         </a:defRPr>
       </a:lvl7pPr>
-      <a:lvl8pPr marL="3312694" algn="l" defTabSz="946484" rtl="0" eaLnBrk="1" latinLnBrk="0" hangingPunct="1">
-        <a:defRPr sz="1913" kern="1200">
+      <a:lvl8pPr marL="2904570" algn="l" defTabSz="829877" rtl="0" eaLnBrk="1" latinLnBrk="0" hangingPunct="1">
+        <a:defRPr sz="1677" kern="1200">
           <a:solidFill>
             <a:schemeClr val="tx1"/>
           </a:solidFill>
@@ -3530,8 +3535,8 @@
           <a:cs typeface="+mn-cs"/>
         </a:defRPr>
       </a:lvl8pPr>
-      <a:lvl9pPr marL="3785936" algn="l" defTabSz="946484" rtl="0" eaLnBrk="1" latinLnBrk="0" hangingPunct="1">
-        <a:defRPr sz="1913" kern="1200">
+      <a:lvl9pPr marL="3319509" algn="l" defTabSz="829877" rtl="0" eaLnBrk="1" latinLnBrk="0" hangingPunct="1">
+        <a:defRPr sz="1677" kern="1200">
           <a:solidFill>
             <a:schemeClr val="tx1"/>
           </a:solidFill>

</xml_diff>